<commit_message>
updated title, fitness landscape figure and equations
</commit_message>
<xml_diff>
--- a/poster.pptx
+++ b/poster.pptx
@@ -288,7 +288,7 @@
           <a:p>
             <a:fld id="{AA8A2AE2-601D-4A2C-970A-532E2F2D0EF3}" type="datetimeFigureOut">
               <a:rPr lang="he-IL" smtClean="0"/>
-              <a:t>ו'/אלול/תשע"ג</a:t>
+              <a:t>ג'/ניסן/תשע"ד</a:t>
             </a:fld>
             <a:endParaRPr lang="he-IL"/>
           </a:p>
@@ -458,7 +458,7 @@
           <a:p>
             <a:fld id="{AA8A2AE2-601D-4A2C-970A-532E2F2D0EF3}" type="datetimeFigureOut">
               <a:rPr lang="he-IL" smtClean="0"/>
-              <a:t>ו'/אלול/תשע"ג</a:t>
+              <a:t>ג'/ניסן/תשע"ד</a:t>
             </a:fld>
             <a:endParaRPr lang="he-IL"/>
           </a:p>
@@ -638,7 +638,7 @@
           <a:p>
             <a:fld id="{AA8A2AE2-601D-4A2C-970A-532E2F2D0EF3}" type="datetimeFigureOut">
               <a:rPr lang="he-IL" smtClean="0"/>
-              <a:t>ו'/אלול/תשע"ג</a:t>
+              <a:t>ג'/ניסן/תשע"ד</a:t>
             </a:fld>
             <a:endParaRPr lang="he-IL"/>
           </a:p>
@@ -808,7 +808,7 @@
           <a:p>
             <a:fld id="{AA8A2AE2-601D-4A2C-970A-532E2F2D0EF3}" type="datetimeFigureOut">
               <a:rPr lang="he-IL" smtClean="0"/>
-              <a:t>ו'/אלול/תשע"ג</a:t>
+              <a:t>ג'/ניסן/תשע"ד</a:t>
             </a:fld>
             <a:endParaRPr lang="he-IL"/>
           </a:p>
@@ -1054,7 +1054,7 @@
           <a:p>
             <a:fld id="{AA8A2AE2-601D-4A2C-970A-532E2F2D0EF3}" type="datetimeFigureOut">
               <a:rPr lang="he-IL" smtClean="0"/>
-              <a:t>ו'/אלול/תשע"ג</a:t>
+              <a:t>ג'/ניסן/תשע"ד</a:t>
             </a:fld>
             <a:endParaRPr lang="he-IL"/>
           </a:p>
@@ -1342,7 +1342,7 @@
           <a:p>
             <a:fld id="{AA8A2AE2-601D-4A2C-970A-532E2F2D0EF3}" type="datetimeFigureOut">
               <a:rPr lang="he-IL" smtClean="0"/>
-              <a:t>ו'/אלול/תשע"ג</a:t>
+              <a:t>ג'/ניסן/תשע"ד</a:t>
             </a:fld>
             <a:endParaRPr lang="he-IL"/>
           </a:p>
@@ -1769,7 +1769,7 @@
           <a:p>
             <a:fld id="{AA8A2AE2-601D-4A2C-970A-532E2F2D0EF3}" type="datetimeFigureOut">
               <a:rPr lang="he-IL" smtClean="0"/>
-              <a:t>ו'/אלול/תשע"ג</a:t>
+              <a:t>ג'/ניסן/תשע"ד</a:t>
             </a:fld>
             <a:endParaRPr lang="he-IL"/>
           </a:p>
@@ -1887,7 +1887,7 @@
           <a:p>
             <a:fld id="{AA8A2AE2-601D-4A2C-970A-532E2F2D0EF3}" type="datetimeFigureOut">
               <a:rPr lang="he-IL" smtClean="0"/>
-              <a:t>ו'/אלול/תשע"ג</a:t>
+              <a:t>ג'/ניסן/תשע"ד</a:t>
             </a:fld>
             <a:endParaRPr lang="he-IL"/>
           </a:p>
@@ -1982,7 +1982,7 @@
           <a:p>
             <a:fld id="{AA8A2AE2-601D-4A2C-970A-532E2F2D0EF3}" type="datetimeFigureOut">
               <a:rPr lang="he-IL" smtClean="0"/>
-              <a:t>ו'/אלול/תשע"ג</a:t>
+              <a:t>ג'/ניסן/תשע"ד</a:t>
             </a:fld>
             <a:endParaRPr lang="he-IL"/>
           </a:p>
@@ -2259,7 +2259,7 @@
           <a:p>
             <a:fld id="{AA8A2AE2-601D-4A2C-970A-532E2F2D0EF3}" type="datetimeFigureOut">
               <a:rPr lang="he-IL" smtClean="0"/>
-              <a:t>ו'/אלול/תשע"ג</a:t>
+              <a:t>ג'/ניסן/תשע"ד</a:t>
             </a:fld>
             <a:endParaRPr lang="he-IL"/>
           </a:p>
@@ -2512,7 +2512,7 @@
           <a:p>
             <a:fld id="{AA8A2AE2-601D-4A2C-970A-532E2F2D0EF3}" type="datetimeFigureOut">
               <a:rPr lang="he-IL" smtClean="0"/>
-              <a:t>ו'/אלול/תשע"ג</a:t>
+              <a:t>ג'/ניסן/תשע"ד</a:t>
             </a:fld>
             <a:endParaRPr lang="he-IL"/>
           </a:p>
@@ -2725,7 +2725,7 @@
           <a:p>
             <a:fld id="{AA8A2AE2-601D-4A2C-970A-532E2F2D0EF3}" type="datetimeFigureOut">
               <a:rPr lang="he-IL" smtClean="0"/>
-              <a:t>ו'/אלול/תשע"ג</a:t>
+              <a:t>ג'/ניסן/תשע"ד</a:t>
             </a:fld>
             <a:endParaRPr lang="he-IL"/>
           </a:p>
@@ -3188,29 +3188,23 @@
           <a:p>
             <a:pPr indent="205684" algn="ctr" rtl="0"/>
             <a:r>
-              <a:rPr lang="en-US" sz="12400" b="1" dirty="0">
+              <a:rPr lang="en-US" sz="12400" b="1" dirty="0" smtClean="0">
                 <a:latin typeface="+mj-lt"/>
               </a:rPr>
-              <a:t>Adaptability, Adaptedness and </a:t>
-            </a:r>
-            <a:endParaRPr lang="en-US" sz="12400" b="1" dirty="0" smtClean="0">
+              <a:t>On the Role of Stress-Induced </a:t>
+            </a:r>
+          </a:p>
+          <a:p>
+            <a:pPr indent="205684" algn="ctr" rtl="0"/>
+            <a:r>
+              <a:rPr lang="en-US" sz="12400" b="1" dirty="0" smtClean="0">
+                <a:latin typeface="+mj-lt"/>
+              </a:rPr>
+              <a:t>Mutagenesis in Evolution</a:t>
+            </a:r>
+            <a:endParaRPr lang="en-US" sz="12400" b="1" dirty="0">
               <a:latin typeface="+mj-lt"/>
             </a:endParaRPr>
-          </a:p>
-          <a:p>
-            <a:pPr indent="205684" algn="ctr" rtl="0"/>
-            <a:r>
-              <a:rPr lang="en-US" sz="12400" b="1" dirty="0" smtClean="0">
-                <a:latin typeface="+mj-lt"/>
-              </a:rPr>
-              <a:t>Stress-Induced </a:t>
-            </a:r>
-            <a:r>
-              <a:rPr lang="en-US" sz="12400" b="1" dirty="0">
-                <a:latin typeface="+mj-lt"/>
-              </a:rPr>
-              <a:t>Mutagenesis</a:t>
-            </a:r>
           </a:p>
         </p:txBody>
       </p:sp>
@@ -3417,7 +3411,7 @@
         <p:spPr bwMode="auto">
           <a:xfrm>
             <a:off x="1800000" y="8010000"/>
-            <a:ext cx="8280000" cy="17786750"/>
+            <a:ext cx="8280000" cy="18146790"/>
           </a:xfrm>
           <a:prstGeom prst="rect">
             <a:avLst/>
@@ -3644,19 +3638,13 @@
               <a:rPr lang="en-US" sz="2400" kern="0" dirty="0" smtClean="0">
                 <a:latin typeface="+mn-lt"/>
               </a:rPr>
-              <a:t> et al. 2007, </a:t>
-            </a:r>
-            <a:r>
-              <a:rPr lang="en-US" sz="2400" kern="0" dirty="0" err="1" smtClean="0">
-                <a:latin typeface="+mn-lt"/>
-              </a:rPr>
-              <a:t>Bjedov</a:t>
+              <a:t> et al. 2007</a:t>
             </a:r>
             <a:r>
               <a:rPr lang="en-US" sz="2400" kern="0" dirty="0" smtClean="0">
                 <a:latin typeface="+mn-lt"/>
               </a:rPr>
-              <a:t> et al. 2003).</a:t>
+              <a:t>, Foster 2007).</a:t>
             </a:r>
             <a:endParaRPr lang="en-US" sz="2400" kern="0" dirty="0">
               <a:latin typeface="+mn-lt"/>
@@ -4084,8 +4072,8 @@
         </p:nvSpPr>
         <p:spPr bwMode="auto">
           <a:xfrm>
-            <a:off x="1800000" y="26804862"/>
-            <a:ext cx="8280000" cy="14199138"/>
+            <a:off x="1800000" y="27308918"/>
+            <a:ext cx="8280000" cy="13695082"/>
           </a:xfrm>
           <a:prstGeom prst="rect">
             <a:avLst/>
@@ -4335,7 +4323,7 @@
               <a:t>Each node represents a genotype. Genotype </a:t>
             </a:r>
             <a:r>
-              <a:rPr lang="en-US" sz="2400" b="1" i="1" kern="0" dirty="0" err="1">
+              <a:rPr lang="en-US" sz="2400" b="1" i="1" kern="0" dirty="0">
                 <a:solidFill>
                   <a:schemeClr val="accent1">
                     <a:lumMod val="75000"/>
@@ -4426,7 +4414,7 @@
               <a:t>with the highest fitness, and the single mutants </a:t>
             </a:r>
             <a:r>
-              <a:rPr lang="en-US" sz="2400" b="1" i="1" kern="0" dirty="0" err="1">
+              <a:rPr lang="en-US" sz="2400" b="1" i="1" kern="0" dirty="0">
                 <a:solidFill>
                   <a:schemeClr val="accent1">
                     <a:lumMod val="75000"/>
@@ -4434,10 +4422,10 @@
                 </a:solidFill>
                 <a:latin typeface="+mn-lt"/>
               </a:rPr>
-              <a:t>Ab</a:t>
-            </a:r>
-            <a:r>
-              <a:rPr lang="en-US" sz="2400" b="1" i="1" kern="0" dirty="0">
+              <a:t>Ab </a:t>
+            </a:r>
+            <a:r>
+              <a:rPr lang="en-US" sz="2400" b="1" kern="0" dirty="0">
                 <a:solidFill>
                   <a:schemeClr val="accent1">
                     <a:lumMod val="75000"/>
@@ -4445,10 +4433,10 @@
                 </a:solidFill>
                 <a:latin typeface="+mn-lt"/>
               </a:rPr>
-              <a:t> </a:t>
-            </a:r>
-            <a:r>
-              <a:rPr lang="en-US" sz="2400" b="1" kern="0" dirty="0">
+              <a:t>and </a:t>
+            </a:r>
+            <a:r>
+              <a:rPr lang="en-US" sz="2400" b="1" i="1" kern="0" dirty="0" err="1">
                 <a:solidFill>
                   <a:schemeClr val="accent1">
                     <a:lumMod val="75000"/>
@@ -4456,10 +4444,10 @@
                 </a:solidFill>
                 <a:latin typeface="+mn-lt"/>
               </a:rPr>
-              <a:t>and </a:t>
-            </a:r>
-            <a:r>
-              <a:rPr lang="en-US" sz="2400" b="1" i="1" kern="0" dirty="0" err="1">
+              <a:t>aB</a:t>
+            </a:r>
+            <a:r>
+              <a:rPr lang="en-US" sz="2400" b="1" i="1" kern="0" dirty="0">
                 <a:solidFill>
                   <a:schemeClr val="accent1">
                     <a:lumMod val="75000"/>
@@ -4467,10 +4455,10 @@
                 </a:solidFill>
                 <a:latin typeface="+mn-lt"/>
               </a:rPr>
-              <a:t>aB</a:t>
-            </a:r>
-            <a:r>
-              <a:rPr lang="en-US" sz="2400" b="1" i="1" kern="0" dirty="0">
+              <a:t> </a:t>
+            </a:r>
+            <a:r>
+              <a:rPr lang="en-US" sz="2400" b="1" kern="0" dirty="0">
                 <a:solidFill>
                   <a:schemeClr val="accent1">
                     <a:lumMod val="75000"/>
@@ -4478,17 +4466,6 @@
                 </a:solidFill>
                 <a:latin typeface="+mn-lt"/>
               </a:rPr>
-              <a:t> </a:t>
-            </a:r>
-            <a:r>
-              <a:rPr lang="en-US" sz="2400" b="1" kern="0" dirty="0">
-                <a:solidFill>
-                  <a:schemeClr val="accent1">
-                    <a:lumMod val="75000"/>
-                  </a:schemeClr>
-                </a:solidFill>
-                <a:latin typeface="+mn-lt"/>
-              </a:rPr>
               <a:t>are adaptive valleys </a:t>
             </a:r>
             <a:r>
@@ -4516,16 +4493,16 @@
                 </a:solidFill>
                 <a:latin typeface="+mn-lt"/>
               </a:rPr>
-              <a:t>than the wildtype - </a:t>
-            </a:r>
-            <a:r>
-              <a:rPr lang="en-US" sz="2400" b="1" kern="0" dirty="0">
+              <a:t>than the </a:t>
+            </a:r>
+            <a:r>
+              <a:rPr lang="en-US" sz="2400" kern="0" dirty="0" smtClean="0">
                 <a:solidFill>
                   <a:srgbClr val="000000"/>
                 </a:solidFill>
                 <a:latin typeface="+mn-lt"/>
               </a:rPr>
-              <a:t>the darker the color the lower the fitness</a:t>
+              <a:t>wildtype</a:t>
             </a:r>
             <a:r>
               <a:rPr lang="en-US" sz="2400" kern="0" dirty="0">
@@ -4534,16 +4511,34 @@
                 </a:solidFill>
                 <a:latin typeface="+mn-lt"/>
               </a:rPr>
-              <a:t>. “RIP” represents genotypes with deleterious mutations that will not contribute to adaptation (</a:t>
-            </a:r>
-            <a:r>
-              <a:rPr lang="en-US" sz="2400" b="1" kern="0" dirty="0">
+              <a:t>. </a:t>
+            </a:r>
+            <a:r>
+              <a:rPr lang="en-US" sz="2400" kern="0" dirty="0" smtClean="0">
                 <a:solidFill>
                   <a:srgbClr val="000000"/>
                 </a:solidFill>
                 <a:latin typeface="+mn-lt"/>
               </a:rPr>
-              <a:t>“the living dead”</a:t>
+              <a:t>“</a:t>
+            </a:r>
+            <a:r>
+              <a:rPr lang="en-US" sz="2400" b="1" kern="0" dirty="0" smtClean="0">
+                <a:solidFill>
+                  <a:srgbClr val="000000"/>
+                </a:solidFill>
+                <a:latin typeface="+mn-lt"/>
+              </a:rPr>
+              <a:t>Evolutionary Dead End</a:t>
+            </a:r>
+            <a:r>
+              <a:rPr lang="en-US" sz="2400" kern="0" dirty="0" smtClean="0">
+                <a:solidFill>
+                  <a:srgbClr val="000000"/>
+                </a:solidFill>
+                <a:latin typeface="+mn-lt"/>
+              </a:rPr>
+              <a:t>” </a:t>
             </a:r>
             <a:r>
               <a:rPr lang="en-US" sz="2400" kern="0" dirty="0">
@@ -4552,7 +4547,16 @@
                 </a:solidFill>
                 <a:latin typeface="+mn-lt"/>
               </a:rPr>
-              <a:t>). </a:t>
+              <a:t>represents genotypes with deleterious mutations that will not contribute to </a:t>
+            </a:r>
+            <a:r>
+              <a:rPr lang="en-US" sz="2400" kern="0" dirty="0" smtClean="0">
+                <a:solidFill>
+                  <a:srgbClr val="000000"/>
+                </a:solidFill>
+                <a:latin typeface="+mn-lt"/>
+              </a:rPr>
+              <a:t>adaptation. </a:t>
             </a:r>
             <a:endParaRPr lang="en-US" sz="2400" kern="0" dirty="0" smtClean="0">
               <a:solidFill>
@@ -4572,7 +4576,7 @@
                 </a:solidFill>
                 <a:latin typeface="+mn-lt"/>
               </a:rPr>
-              <a:t>Arrows</a:t>
+              <a:t>Lines </a:t>
             </a:r>
             <a:r>
               <a:rPr lang="en-US" sz="2400" kern="0" dirty="0" smtClean="0">
@@ -4581,7 +4585,7 @@
                 </a:solidFill>
                 <a:latin typeface="+mn-lt"/>
               </a:rPr>
-              <a:t> </a:t>
+              <a:t>define mutations </a:t>
             </a:r>
             <a:r>
               <a:rPr lang="en-US" sz="2400" kern="0" dirty="0">
@@ -4590,7 +4594,7 @@
                 </a:solidFill>
                 <a:latin typeface="+mn-lt"/>
               </a:rPr>
-              <a:t>define the direction of mutation and denote the relevant mutation rate: </a:t>
+              <a:t>and denote the relevant mutation rate: </a:t>
             </a:r>
             <a:r>
               <a:rPr lang="en-US" sz="2400" b="1" i="1" kern="0" dirty="0">
@@ -4777,8 +4781,8 @@
         </p:nvSpPr>
         <p:spPr bwMode="auto">
           <a:xfrm>
-            <a:off x="10980000" y="26804862"/>
-            <a:ext cx="8280000" cy="14199138"/>
+            <a:off x="10980000" y="27308918"/>
+            <a:ext cx="8280000" cy="13695082"/>
           </a:xfrm>
           <a:prstGeom prst="rect">
             <a:avLst/>
@@ -4993,22 +4997,58 @@
               <a:t>slash (</a:t>
             </a:r>
             <a:r>
-              <a:rPr lang="en-GB" sz="2400" i="1" kern="0" dirty="0" err="1" smtClean="0">
+              <a:rPr lang="en-GB" sz="2400" i="1" kern="0" dirty="0" smtClean="0">
                 <a:solidFill>
                   <a:srgbClr val="000000"/>
                 </a:solidFill>
                 <a:latin typeface="+mn-lt"/>
               </a:rPr>
+              <a:t>ab/2</a:t>
+            </a:r>
+            <a:r>
+              <a:rPr lang="en-GB" sz="2400" kern="0" dirty="0" smtClean="0">
+                <a:solidFill>
+                  <a:srgbClr val="000000"/>
+                </a:solidFill>
+                <a:latin typeface="+mn-lt"/>
+              </a:rPr>
+              <a:t> is </a:t>
+            </a:r>
+            <a:r>
+              <a:rPr lang="en-GB" sz="2400" i="1" kern="0" dirty="0" smtClean="0">
+                <a:solidFill>
+                  <a:srgbClr val="000000"/>
+                </a:solidFill>
+                <a:latin typeface="+mn-lt"/>
+              </a:rPr>
               <a:t>ab</a:t>
             </a:r>
             <a:r>
-              <a:rPr lang="en-GB" sz="2400" i="1" kern="0" dirty="0" smtClean="0">
+              <a:rPr lang="en-GB" sz="2400" kern="0" dirty="0" smtClean="0">
                 <a:solidFill>
                   <a:srgbClr val="000000"/>
                 </a:solidFill>
                 <a:latin typeface="+mn-lt"/>
               </a:rPr>
-              <a:t>/2</a:t>
+              <a:t> with two deleterious mutations) – so there are no</a:t>
+            </a:r>
+            <a:r>
+              <a:rPr lang="en-GB" sz="2400" b="1" kern="0" dirty="0" smtClean="0">
+                <a:solidFill>
+                  <a:srgbClr val="000000"/>
+                </a:solidFill>
+                <a:latin typeface="+mn-lt"/>
+              </a:rPr>
+              <a:t> </a:t>
+            </a:r>
+            <a:r>
+              <a:rPr lang="en-GB" sz="2400" b="1" kern="0" dirty="0" smtClean="0">
+                <a:solidFill>
+                  <a:srgbClr val="000000"/>
+                </a:solidFill>
+                <a:latin typeface="+mn-lt"/>
+              </a:rPr>
+              <a:t>“Evolutionary Dead Ends”</a:t>
             </a:r>
             <a:r>
               <a:rPr lang="en-GB" sz="2400" kern="0" dirty="0" smtClean="0">
@@ -5017,26 +5057,14 @@
                 </a:solidFill>
                 <a:latin typeface="+mn-lt"/>
               </a:rPr>
-              <a:t> is </a:t>
-            </a:r>
-            <a:r>
-              <a:rPr lang="en-GB" sz="2400" i="1" kern="0" dirty="0" err="1" smtClean="0">
-                <a:solidFill>
-                  <a:srgbClr val="000000"/>
-                </a:solidFill>
-                <a:latin typeface="+mn-lt"/>
-              </a:rPr>
-              <a:t>ab</a:t>
-            </a:r>
-            <a:r>
-              <a:rPr lang="en-GB" sz="2400" kern="0" dirty="0" smtClean="0">
-                <a:solidFill>
-                  <a:srgbClr val="000000"/>
-                </a:solidFill>
-                <a:latin typeface="+mn-lt"/>
-              </a:rPr>
-              <a:t> with two deleterious mutations) – so there are no “living dead”. </a:t>
-            </a:r>
+              <a:t>. </a:t>
+            </a:r>
+            <a:endParaRPr lang="en-GB" sz="2400" kern="0" dirty="0" smtClean="0">
+              <a:solidFill>
+                <a:srgbClr val="000000"/>
+              </a:solidFill>
+              <a:latin typeface="+mn-lt"/>
+            </a:endParaRPr>
           </a:p>
           <a:p>
             <a:pPr marL="0" indent="205684" algn="just" defTabSz="908834" rtl="0" eaLnBrk="1" hangingPunct="1">
@@ -5082,7 +5110,69 @@
                 </a:solidFill>
                 <a:latin typeface="+mn-lt"/>
               </a:rPr>
-              <a:t>the simulations has up to 25. </a:t>
+              <a:t>the simulations </a:t>
+            </a:r>
+            <a:r>
+              <a:rPr lang="en-GB" sz="2400" kern="0" dirty="0" smtClean="0">
+                <a:solidFill>
+                  <a:srgbClr val="000000"/>
+                </a:solidFill>
+                <a:latin typeface="+mn-lt"/>
+              </a:rPr>
+              <a:t>have </a:t>
+            </a:r>
+            <a:r>
+              <a:rPr lang="en-GB" sz="2400" kern="0" dirty="0">
+                <a:solidFill>
+                  <a:srgbClr val="000000"/>
+                </a:solidFill>
+                <a:latin typeface="+mn-lt"/>
+              </a:rPr>
+              <a:t>up to 25. </a:t>
+            </a:r>
+            <a:endParaRPr lang="en-GB" sz="2400" kern="0" dirty="0" smtClean="0">
+              <a:solidFill>
+                <a:srgbClr val="000000"/>
+              </a:solidFill>
+              <a:latin typeface="+mn-lt"/>
+            </a:endParaRPr>
+          </a:p>
+          <a:p>
+            <a:pPr marL="0" indent="205684" algn="just" defTabSz="908834" rtl="0" eaLnBrk="1" hangingPunct="1">
+              <a:spcBef>
+                <a:spcPct val="10000"/>
+              </a:spcBef>
+              <a:tabLst>
+                <a:tab pos="631135" algn="l"/>
+              </a:tabLst>
+              <a:defRPr/>
+            </a:pPr>
+            <a:r>
+              <a:rPr lang="en-GB" sz="2400" kern="0" dirty="0" smtClean="0">
+                <a:solidFill>
+                  <a:srgbClr val="000000"/>
+                </a:solidFill>
+                <a:latin typeface="+mn-lt"/>
+              </a:rPr>
+              <a:t>The simulations do not make assumptions on the distribution of deleterious alleles at the </a:t>
+            </a:r>
+            <a:r>
+              <a:rPr lang="en-GB" sz="2400" b="1" kern="0" dirty="0" smtClean="0">
+                <a:solidFill>
+                  <a:srgbClr val="000000"/>
+                </a:solidFill>
+                <a:latin typeface="+mn-lt"/>
+              </a:rPr>
+              <a:t>mutation-selection balance</a:t>
+            </a:r>
+            <a:r>
+              <a:rPr lang="en-GB" sz="2400" kern="0" dirty="0" smtClean="0">
+                <a:solidFill>
+                  <a:srgbClr val="000000"/>
+                </a:solidFill>
+                <a:latin typeface="+mn-lt"/>
+              </a:rPr>
+              <a:t>, but rather allow this balance to evolve before the adaptation process starts.</a:t>
             </a:r>
             <a:endParaRPr lang="en-US" sz="2400" kern="0" dirty="0">
               <a:solidFill>
@@ -5273,7 +5363,7 @@
         </p:nvSpPr>
         <p:spPr bwMode="auto">
           <a:xfrm>
-            <a:off x="20160000" y="26804862"/>
+            <a:off x="20160000" y="27308918"/>
             <a:ext cx="8280000" cy="4248472"/>
           </a:xfrm>
           <a:prstGeom prst="rect">
@@ -6135,29 +6225,68 @@
               <a:buAutoNum type="arabicPeriod"/>
             </a:pPr>
             <a:r>
-              <a:rPr lang="en-US" sz="2100" dirty="0" err="1" smtClean="0">
-                <a:latin typeface="+mn-lt"/>
-              </a:rPr>
-              <a:t>Bjedov</a:t>
-            </a:r>
-            <a:r>
               <a:rPr lang="en-US" sz="2100" dirty="0" smtClean="0">
                 <a:latin typeface="+mn-lt"/>
               </a:rPr>
-              <a:t> I, et al. </a:t>
-            </a:r>
-            <a:r>
-              <a:rPr lang="en-US" sz="2100" i="1" dirty="0" smtClean="0">
-                <a:latin typeface="+mn-lt"/>
-              </a:rPr>
-              <a:t>Science</a:t>
+              <a:t>Foster, PL. </a:t>
+            </a:r>
+            <a:r>
+              <a:rPr lang="en-US" sz="2100" i="1" dirty="0" err="1">
+                <a:latin typeface="+mn-lt"/>
+              </a:rPr>
+              <a:t>Crit</a:t>
+            </a:r>
+            <a:r>
+              <a:rPr lang="en-US" sz="2100" i="1" dirty="0">
+                <a:latin typeface="+mn-lt"/>
+              </a:rPr>
+              <a:t> Rev </a:t>
+            </a:r>
+            <a:r>
+              <a:rPr lang="en-US" sz="2100" i="1" dirty="0" err="1">
+                <a:latin typeface="+mn-lt"/>
+              </a:rPr>
+              <a:t>Biochem</a:t>
+            </a:r>
+            <a:r>
+              <a:rPr lang="en-US" sz="2100" i="1" dirty="0">
+                <a:latin typeface="+mn-lt"/>
+              </a:rPr>
+              <a:t> </a:t>
+            </a:r>
+            <a:r>
+              <a:rPr lang="en-US" sz="2100" i="1" dirty="0" err="1">
+                <a:latin typeface="+mn-lt"/>
+              </a:rPr>
+              <a:t>Mol</a:t>
+            </a:r>
+            <a:r>
+              <a:rPr lang="en-US" sz="2100" i="1" dirty="0">
+                <a:latin typeface="+mn-lt"/>
+              </a:rPr>
+              <a:t> </a:t>
+            </a:r>
+            <a:r>
+              <a:rPr lang="en-US" sz="2100" i="1" dirty="0" err="1">
+                <a:latin typeface="+mn-lt"/>
+              </a:rPr>
+              <a:t>Biol</a:t>
+            </a:r>
+            <a:r>
+              <a:rPr lang="en-US" sz="2100" i="1" dirty="0">
+                <a:latin typeface="+mn-lt"/>
+              </a:rPr>
+              <a:t> 2007</a:t>
             </a:r>
             <a:r>
               <a:rPr lang="en-US" sz="2100" dirty="0" smtClean="0">
                 <a:latin typeface="+mn-lt"/>
               </a:rPr>
-              <a:t> 2003, 300:1404–9</a:t>
-            </a:r>
+              <a:t>, 42:373-97</a:t>
+            </a:r>
+            <a:endParaRPr lang="en-US" sz="2100" dirty="0" smtClean="0">
+              <a:latin typeface="+mn-lt"/>
+            </a:endParaRPr>
           </a:p>
           <a:p>
             <a:pPr lvl="0" algn="l" rtl="0">
@@ -6443,8 +6572,8 @@
           </a:p>
         </p:txBody>
       </p:sp>
-      <mc:AlternateContent xmlns:mc="http://schemas.openxmlformats.org/markup-compatibility/2006" xmlns:a14="http://schemas.microsoft.com/office/drawing/2010/main">
-        <mc:Choice Requires="a14">
+      <mc:AlternateContent xmlns:mc="http://schemas.openxmlformats.org/markup-compatibility/2006">
+        <mc:Choice xmlns:a14="http://schemas.microsoft.com/office/drawing/2010/main" Requires="a14">
           <p:sp>
             <p:nvSpPr>
               <p:cNvPr id="14" name="Text Box 13"/>
@@ -6456,7 +6585,7 @@
             <p:spPr bwMode="auto">
               <a:xfrm>
                 <a:off x="10980000" y="8010000"/>
-                <a:ext cx="8280000" cy="17786750"/>
+                <a:ext cx="8280000" cy="18146790"/>
               </a:xfrm>
               <a:prstGeom prst="rect">
                 <a:avLst/>
@@ -6823,38 +6952,28 @@
                         <m:t>≈</m:t>
                       </m:r>
                       <m:r>
-                        <a:rPr lang="en-US" i="1">
-                          <a:latin typeface="Cambria Math"/>
-                        </a:rPr>
-                        <m:t>2</m:t>
+                        <a:rPr lang="en-US" i="1"/>
+                        <m:t>4</m:t>
                       </m:r>
                       <m:r>
-                        <a:rPr lang="en-US" i="1">
-                          <a:latin typeface="Cambria Math"/>
-                        </a:rPr>
+                        <a:rPr lang="en-US" i="1"/>
                         <m:t>𝑁𝐻</m:t>
                       </m:r>
                       <m:sSup>
                         <m:sSupPr>
                           <m:ctrlPr>
-                            <a:rPr lang="en-US" i="1">
-                              <a:latin typeface="Cambria Math"/>
-                            </a:rPr>
+                            <a:rPr lang="en-US" i="1"/>
                           </m:ctrlPr>
                         </m:sSupPr>
                         <m:e>
                           <m:r>
-                            <a:rPr lang="en-US" i="1">
-                              <a:latin typeface="Cambria Math"/>
-                            </a:rPr>
+                            <a:rPr lang="en-US" i="1"/>
                             <m:t>𝜇</m:t>
                           </m:r>
                         </m:e>
                         <m:sup>
                           <m:r>
-                            <a:rPr lang="en-US" i="1">
-                              <a:latin typeface="Cambria Math"/>
-                            </a:rPr>
+                            <a:rPr lang="en-US" i="1"/>
                             <m:t>2</m:t>
                           </m:r>
                         </m:sup>
@@ -6862,104 +6981,39 @@
                       <m:d>
                         <m:dPr>
                           <m:ctrlPr>
-                            <a:rPr lang="en-US" i="1">
-                              <a:latin typeface="Cambria Math"/>
-                            </a:rPr>
+                            <a:rPr lang="en-US" i="1"/>
                           </m:ctrlPr>
                         </m:dPr>
                         <m:e>
                           <m:r>
-                            <a:rPr lang="en-US" i="1">
-                              <a:latin typeface="Cambria Math"/>
-                            </a:rPr>
+                            <a:rPr lang="en-US" i="1"/>
                             <m:t>1</m:t>
                           </m:r>
                           <m:r>
-                            <a:rPr lang="en-US" i="1">
-                              <a:latin typeface="Cambria Math"/>
-                            </a:rPr>
+                            <a:rPr lang="en-US" i="1"/>
                             <m:t>−</m:t>
                           </m:r>
-                          <m:r>
-                            <a:rPr lang="en-US" i="1">
-                              <a:latin typeface="Cambria Math"/>
-                            </a:rPr>
-                            <m:t>𝑈</m:t>
-                          </m:r>
+                          <m:f>
+                            <m:fPr>
+                              <m:ctrlPr>
+                                <a:rPr lang="en-US" i="1"/>
+                              </m:ctrlPr>
+                            </m:fPr>
+                            <m:num>
+                              <m:r>
+                                <a:rPr lang="en-US" i="1"/>
+                                <m:t>𝑈</m:t>
+                              </m:r>
+                            </m:num>
+                            <m:den>
+                              <m:r>
+                                <a:rPr lang="en-US" i="1"/>
+                                <m:t>𝑠</m:t>
+                              </m:r>
+                            </m:den>
+                          </m:f>
                         </m:e>
                       </m:d>
-                      <m:d>
-                        <m:dPr>
-                          <m:ctrlPr>
-                            <a:rPr lang="en-US" i="1">
-                              <a:latin typeface="Cambria Math"/>
-                            </a:rPr>
-                          </m:ctrlPr>
-                        </m:dPr>
-                        <m:e>
-                          <m:r>
-                            <a:rPr lang="en-US" i="1">
-                              <a:latin typeface="Cambria Math"/>
-                            </a:rPr>
-                            <m:t>2</m:t>
-                          </m:r>
-                          <m:r>
-                            <a:rPr lang="en-US" i="1">
-                              <a:latin typeface="Cambria Math"/>
-                            </a:rPr>
-                            <m:t>−</m:t>
-                          </m:r>
-                          <m:r>
-                            <a:rPr lang="en-US" i="1">
-                              <a:latin typeface="Cambria Math"/>
-                            </a:rPr>
-                            <m:t>𝑈</m:t>
-                          </m:r>
-                        </m:e>
-                      </m:d>
-                      <m:r>
-                        <a:rPr lang="en-US" i="1">
-                          <a:latin typeface="Cambria Math"/>
-                        </a:rPr>
-                        <m:t>≈</m:t>
-                      </m:r>
-                      <m:r>
-                        <a:rPr lang="en-US" i="1">
-                          <a:latin typeface="Cambria Math"/>
-                        </a:rPr>
-                        <m:t>4</m:t>
-                      </m:r>
-                      <m:r>
-                        <a:rPr lang="en-US" i="1">
-                          <a:latin typeface="Cambria Math"/>
-                        </a:rPr>
-                        <m:t>𝑁𝐻</m:t>
-                      </m:r>
-                      <m:sSup>
-                        <m:sSupPr>
-                          <m:ctrlPr>
-                            <a:rPr lang="en-US" i="1">
-                              <a:latin typeface="Cambria Math"/>
-                            </a:rPr>
-                          </m:ctrlPr>
-                        </m:sSupPr>
-                        <m:e>
-                          <m:r>
-                            <a:rPr lang="en-US" i="1">
-                              <a:latin typeface="Cambria Math"/>
-                            </a:rPr>
-                            <m:t>𝜇</m:t>
-                          </m:r>
-                        </m:e>
-                        <m:sup>
-                          <m:r>
-                            <a:rPr lang="en-US" i="1">
-                              <a:latin typeface="Cambria Math"/>
-                            </a:rPr>
-                            <m:t>2</m:t>
-                          </m:r>
-                        </m:sup>
-                      </m:sSup>
                     </m:oMath>
                   </m:oMathPara>
                 </a14:m>
@@ -7016,62 +7070,88 @@
                         </a:rPr>
                         <m:t>≈</m:t>
                       </m:r>
+                      <m:sSub>
+                        <m:sSubPr>
+                          <m:ctrlPr>
+                            <a:rPr lang="en-US" i="1"/>
+                          </m:ctrlPr>
+                        </m:sSubPr>
+                        <m:e>
+                          <m:r>
+                            <a:rPr lang="en-US" i="1"/>
+                            <m:t>𝜈</m:t>
+                          </m:r>
+                        </m:e>
+                        <m:sub>
+                          <m:r>
+                            <a:rPr lang="en-US" i="1"/>
+                            <m:t>𝑁𝑀</m:t>
+                          </m:r>
+                        </m:sub>
+                      </m:sSub>
+                      <m:r>
+                        <a:rPr lang="en-US" i="1"/>
+                        <m:t>⋅</m:t>
+                      </m:r>
                       <m:sSup>
                         <m:sSupPr>
                           <m:ctrlPr>
-                            <a:rPr lang="en-US" i="1">
-                              <a:latin typeface="Cambria Math"/>
-                            </a:rPr>
+                            <a:rPr lang="en-US" i="1"/>
                           </m:ctrlPr>
                         </m:sSupPr>
                         <m:e>
                           <m:r>
-                            <a:rPr lang="en-US" i="1">
-                              <a:latin typeface="Cambria Math"/>
-                            </a:rPr>
+                            <a:rPr lang="en-US" i="1"/>
                             <m:t>𝜏</m:t>
                           </m:r>
                         </m:e>
                         <m:sup>
                           <m:r>
-                            <a:rPr lang="en-US" i="1">
-                              <a:latin typeface="Cambria Math"/>
-                            </a:rPr>
+                            <a:rPr lang="en-US" i="1"/>
                             <m:t>2</m:t>
                           </m:r>
                         </m:sup>
                       </m:sSup>
-                      <m:r>
-                        <a:rPr lang="en-US" i="1">
-                          <a:latin typeface="Cambria Math"/>
-                        </a:rPr>
-                        <m:t>∙</m:t>
-                      </m:r>
-                      <m:sSub>
-                        <m:sSubPr>
+                      <m:d>
+                        <m:dPr>
                           <m:ctrlPr>
-                            <a:rPr lang="en-US" i="1">
-                              <a:latin typeface="Cambria Math"/>
-                            </a:rPr>
+                            <a:rPr lang="en-US" i="1"/>
                           </m:ctrlPr>
-                        </m:sSubPr>
+                        </m:dPr>
                         <m:e>
                           <m:r>
-                            <a:rPr lang="en-US" i="1">
-                              <a:latin typeface="Cambria Math"/>
-                            </a:rPr>
-                            <m:t>𝜈</m:t>
+                            <a:rPr lang="en-US" i="1"/>
+                            <m:t>1</m:t>
                           </m:r>
+                          <m:r>
+                            <a:rPr lang="en-US" i="1"/>
+                            <m:t>−</m:t>
+                          </m:r>
+                          <m:f>
+                            <m:fPr>
+                              <m:ctrlPr>
+                                <a:rPr lang="en-US" i="1"/>
+                              </m:ctrlPr>
+                            </m:fPr>
+                            <m:num>
+                              <m:r>
+                                <a:rPr lang="en-US" i="1"/>
+                                <m:t>𝜏</m:t>
+                              </m:r>
+                              <m:r>
+                                <a:rPr lang="en-US" i="1"/>
+                                <m:t>𝑈</m:t>
+                              </m:r>
+                            </m:num>
+                            <m:den>
+                              <m:r>
+                                <a:rPr lang="en-US" i="1"/>
+                                <m:t>𝑠</m:t>
+                              </m:r>
+                            </m:den>
+                          </m:f>
                         </m:e>
-                        <m:sub>
-                          <m:r>
-                            <a:rPr lang="en-US" i="1">
-                              <a:latin typeface="Cambria Math"/>
-                            </a:rPr>
-                            <m:t>𝑁𝑀</m:t>
-                          </m:r>
-                        </m:sub>
-                      </m:sSub>
+                      </m:d>
                     </m:oMath>
                   </m:oMathPara>
                 </a14:m>
@@ -7131,137 +7211,55 @@
                       <m:sSub>
                         <m:sSubPr>
                           <m:ctrlPr>
-                            <a:rPr lang="en-US" i="1">
-                              <a:latin typeface="Cambria Math"/>
-                            </a:rPr>
+                            <a:rPr lang="en-US" i="1"/>
                           </m:ctrlPr>
                         </m:sSubPr>
                         <m:e>
                           <m:r>
-                            <a:rPr lang="en-US" i="1">
-                              <a:latin typeface="Cambria Math"/>
-                            </a:rPr>
+                            <a:rPr lang="en-US" i="1"/>
                             <m:t>𝜈</m:t>
                           </m:r>
                         </m:e>
                         <m:sub>
                           <m:r>
-                            <a:rPr lang="en-US" i="1">
-                              <a:latin typeface="Cambria Math"/>
-                            </a:rPr>
+                            <a:rPr lang="en-US" i="1"/>
                             <m:t>𝑁𝑀</m:t>
                           </m:r>
                         </m:sub>
                       </m:sSub>
                       <m:r>
-                        <a:rPr lang="en-US" i="1">
-                          <a:latin typeface="Cambria Math"/>
-                        </a:rPr>
-                        <m:t>∙</m:t>
+                        <a:rPr lang="en-US" i="1"/>
+                        <m:t>⋅</m:t>
                       </m:r>
-                      <m:f>
-                        <m:fPr>
+                      <m:r>
+                        <a:rPr lang="en-US" i="1"/>
+                        <m:t>𝜏</m:t>
+                      </m:r>
+                      <m:d>
+                        <m:dPr>
                           <m:ctrlPr>
-                            <a:rPr lang="en-US" i="1">
-                              <a:latin typeface="Cambria Math"/>
-                            </a:rPr>
+                            <a:rPr lang="en-US" i="1"/>
                           </m:ctrlPr>
-                        </m:fPr>
-                        <m:num>
+                        </m:dPr>
+                        <m:e>
                           <m:r>
-                            <a:rPr lang="en-US" i="1">
-                              <a:latin typeface="Cambria Math"/>
-                            </a:rPr>
-                            <m:t>2</m:t>
+                            <a:rPr lang="en-US" i="1"/>
+                            <m:t>1</m:t>
                           </m:r>
                           <m:r>
-                            <a:rPr lang="en-US" i="1">
-                              <a:latin typeface="Cambria Math"/>
-                            </a:rPr>
+                            <a:rPr lang="en-US" i="1"/>
+                            <m:t>−</m:t>
+                          </m:r>
+                          <m:r>
+                            <a:rPr lang="en-US" i="1"/>
                             <m:t>𝜏</m:t>
                           </m:r>
-                        </m:num>
-                        <m:den>
-                          <m:d>
-                            <m:dPr>
-                              <m:ctrlPr>
-                                <a:rPr lang="en-US" i="1">
-                                  <a:latin typeface="Cambria Math"/>
-                                </a:rPr>
-                              </m:ctrlPr>
-                            </m:dPr>
-                            <m:e>
-                              <m:r>
-                                <a:rPr lang="en-US" i="1">
-                                  <a:latin typeface="Cambria Math"/>
-                                </a:rPr>
-                                <m:t>2</m:t>
-                              </m:r>
-                              <m:r>
-                                <a:rPr lang="en-US" i="1">
-                                  <a:latin typeface="Cambria Math"/>
-                                </a:rPr>
-                                <m:t>−</m:t>
-                              </m:r>
-                              <m:r>
-                                <a:rPr lang="en-US" i="1">
-                                  <a:latin typeface="Cambria Math"/>
-                                </a:rPr>
-                                <m:t>𝜏</m:t>
-                              </m:r>
-                              <m:r>
-                                <a:rPr lang="en-US" i="1">
-                                  <a:latin typeface="Cambria Math"/>
-                                </a:rPr>
-                                <m:t>𝑈</m:t>
-                              </m:r>
-                            </m:e>
-                          </m:d>
-                        </m:den>
-                      </m:f>
-                      <m:r>
-                        <a:rPr lang="en-US" i="1">
-                          <a:latin typeface="Cambria Math"/>
-                        </a:rPr>
-                        <m:t>≈</m:t>
-                      </m:r>
-                      <m:r>
-                        <a:rPr lang="en-US" i="1">
-                          <a:latin typeface="Cambria Math"/>
-                        </a:rPr>
-                        <m:t>𝜏</m:t>
-                      </m:r>
-                      <m:r>
-                        <a:rPr lang="en-US" i="1">
-                          <a:latin typeface="Cambria Math"/>
-                        </a:rPr>
-                        <m:t>∙</m:t>
-                      </m:r>
-                      <m:sSub>
-                        <m:sSubPr>
-                          <m:ctrlPr>
-                            <a:rPr lang="en-US" i="1">
-                              <a:latin typeface="Cambria Math"/>
-                            </a:rPr>
-                          </m:ctrlPr>
-                        </m:sSubPr>
-                        <m:e>
                           <m:r>
-                            <a:rPr lang="en-US" i="1">
-                              <a:latin typeface="Cambria Math"/>
-                            </a:rPr>
-                            <m:t>𝜈</m:t>
+                            <a:rPr lang="en-US" i="1"/>
+                            <m:t>𝑈</m:t>
                           </m:r>
                         </m:e>
-                        <m:sub>
-                          <m:r>
-                            <a:rPr lang="en-US" i="1">
-                              <a:latin typeface="Cambria Math"/>
-                            </a:rPr>
-                            <m:t>𝑁𝑀</m:t>
-                          </m:r>
-                        </m:sub>
-                      </m:sSub>
+                      </m:d>
                     </m:oMath>
                   </m:oMathPara>
                 </a14:m>
@@ -7468,7 +7466,7 @@
             </p:txBody>
           </p:sp>
         </mc:Choice>
-        <mc:Fallback xmlns="">
+        <mc:Fallback>
           <p:sp>
             <p:nvSpPr>
               <p:cNvPr id="14" name="Text Box 13"/>
@@ -7480,7 +7478,7 @@
             <p:spPr bwMode="auto">
               <a:xfrm>
                 <a:off x="10980000" y="8010000"/>
-                <a:ext cx="8280000" cy="17786750"/>
+                <a:ext cx="8280000" cy="18146790"/>
               </a:xfrm>
               <a:prstGeom prst="rect">
                 <a:avLst/>
@@ -7526,7 +7524,7 @@
         <p:spPr bwMode="auto">
           <a:xfrm>
             <a:off x="20160000" y="8010000"/>
-            <a:ext cx="8280000" cy="17786750"/>
+            <a:ext cx="8280000" cy="18146790"/>
           </a:xfrm>
           <a:prstGeom prst="rect">
             <a:avLst/>
@@ -8291,7 +8289,16 @@
                 <a:latin typeface="Calibri"/>
                 <a:ea typeface="+mn-ea"/>
               </a:rPr>
-              <a:t> of populations, </a:t>
+              <a:t> of populations, represented by their adaptation rate. </a:t>
+            </a:r>
+            <a:r>
+              <a:rPr lang="en-US" sz="2400" kern="0" dirty="0">
+                <a:solidFill>
+                  <a:schemeClr val="accent1"/>
+                </a:solidFill>
+                <a:latin typeface="+mn-lt"/>
+              </a:rPr>
+              <a:t>SIM</a:t>
             </a:r>
             <a:r>
               <a:rPr lang="en-US" sz="2400" kern="0" dirty="0" smtClean="0">
@@ -8301,7 +8308,16 @@
                 <a:latin typeface="Calibri"/>
                 <a:ea typeface="+mn-ea"/>
               </a:rPr>
-              <a:t>represented by </a:t>
+              <a:t>, in contrast to </a:t>
+            </a:r>
+            <a:r>
+              <a:rPr lang="en-US" sz="2400" kern="0" dirty="0">
+                <a:solidFill>
+                  <a:schemeClr val="accent2"/>
+                </a:solidFill>
+                <a:latin typeface="+mn-lt"/>
+              </a:rPr>
+              <a:t>CM</a:t>
             </a:r>
             <a:r>
               <a:rPr lang="en-US" sz="2400" kern="0" dirty="0" smtClean="0">
@@ -8311,45 +8327,27 @@
                 <a:latin typeface="Calibri"/>
                 <a:ea typeface="+mn-ea"/>
               </a:rPr>
-              <a:t>their </a:t>
-            </a:r>
-            <a:r>
-              <a:rPr lang="en-US" sz="2400" kern="0" dirty="0" smtClean="0">
+              <a:t>, doesn’t reduce the </a:t>
+            </a:r>
+            <a:r>
+              <a:rPr lang="en-US" sz="2400" b="1" i="1" kern="0" dirty="0" smtClean="0">
                 <a:solidFill>
                   <a:srgbClr val="000000"/>
                 </a:solidFill>
                 <a:latin typeface="Calibri"/>
                 <a:ea typeface="+mn-ea"/>
               </a:rPr>
-              <a:t>adaptation rate. </a:t>
+              <a:t>adaptedness</a:t>
             </a:r>
             <a:r>
               <a:rPr lang="en-US" sz="2400" kern="0" dirty="0">
-                <a:solidFill>
-                  <a:schemeClr val="accent1"/>
-                </a:solidFill>
-                <a:latin typeface="+mn-lt"/>
-              </a:rPr>
-              <a:t>SIM</a:t>
-            </a:r>
-            <a:r>
-              <a:rPr lang="en-US" sz="2400" kern="0" dirty="0" smtClean="0">
                 <a:solidFill>
                   <a:srgbClr val="000000"/>
                 </a:solidFill>
                 <a:latin typeface="Calibri"/>
                 <a:ea typeface="+mn-ea"/>
               </a:rPr>
-              <a:t>, in contrast to </a:t>
-            </a:r>
-            <a:r>
-              <a:rPr lang="en-US" sz="2400" kern="0" dirty="0">
-                <a:solidFill>
-                  <a:schemeClr val="accent2"/>
-                </a:solidFill>
-                <a:latin typeface="+mn-lt"/>
-              </a:rPr>
-              <a:t>CM</a:t>
+              <a:t> </a:t>
             </a:r>
             <a:r>
               <a:rPr lang="en-US" sz="2400" kern="0" dirty="0" smtClean="0">
@@ -8359,67 +8357,7 @@
                 <a:latin typeface="Calibri"/>
                 <a:ea typeface="+mn-ea"/>
               </a:rPr>
-              <a:t>, doesn’t </a:t>
-            </a:r>
-            <a:r>
-              <a:rPr lang="en-US" sz="2400" kern="0" dirty="0" smtClean="0">
-                <a:solidFill>
-                  <a:srgbClr val="000000"/>
-                </a:solidFill>
-                <a:latin typeface="Calibri"/>
-                <a:ea typeface="+mn-ea"/>
-              </a:rPr>
-              <a:t>reduce </a:t>
-            </a:r>
-            <a:r>
-              <a:rPr lang="en-US" sz="2400" kern="0" dirty="0" smtClean="0">
-                <a:solidFill>
-                  <a:srgbClr val="000000"/>
-                </a:solidFill>
-                <a:latin typeface="Calibri"/>
-                <a:ea typeface="+mn-ea"/>
-              </a:rPr>
-              <a:t>the </a:t>
-            </a:r>
-            <a:r>
-              <a:rPr lang="en-US" sz="2400" b="1" i="1" kern="0" dirty="0" smtClean="0">
-                <a:solidFill>
-                  <a:srgbClr val="000000"/>
-                </a:solidFill>
-                <a:latin typeface="Calibri"/>
-                <a:ea typeface="+mn-ea"/>
-              </a:rPr>
-              <a:t>adaptedness</a:t>
-            </a:r>
-            <a:r>
-              <a:rPr lang="en-US" sz="2400" kern="0" dirty="0">
-                <a:solidFill>
-                  <a:srgbClr val="000000"/>
-                </a:solidFill>
-                <a:latin typeface="Calibri"/>
-                <a:ea typeface="+mn-ea"/>
-              </a:rPr>
-              <a:t> </a:t>
-            </a:r>
-            <a:r>
-              <a:rPr lang="en-US" sz="2400" kern="0" dirty="0" smtClean="0">
-                <a:solidFill>
-                  <a:srgbClr val="000000"/>
-                </a:solidFill>
-                <a:latin typeface="Calibri"/>
-                <a:ea typeface="+mn-ea"/>
-              </a:rPr>
-              <a:t>of populations, represented </a:t>
-            </a:r>
-            <a:r>
-              <a:rPr lang="en-US" sz="2400" kern="0" dirty="0" smtClean="0">
-                <a:solidFill>
-                  <a:srgbClr val="000000"/>
-                </a:solidFill>
-                <a:latin typeface="Calibri"/>
-                <a:ea typeface="+mn-ea"/>
-              </a:rPr>
-              <a:t>by the mean fitness in stable environments. </a:t>
+              <a:t>of populations, represented by the mean fitness in stable environments. </a:t>
             </a:r>
           </a:p>
           <a:p>
@@ -8812,7 +8750,7 @@
         </p:blipFill>
         <p:spPr bwMode="auto">
           <a:xfrm>
-            <a:off x="24140987" y="39190238"/>
+            <a:off x="23817123" y="39190238"/>
             <a:ext cx="1548000" cy="1548000"/>
           </a:xfrm>
           <a:prstGeom prst="rect">
@@ -8854,7 +8792,7 @@
         </p:blipFill>
         <p:spPr bwMode="auto">
           <a:xfrm>
-            <a:off x="25845143" y="40270358"/>
+            <a:off x="25725163" y="40270358"/>
             <a:ext cx="2400300" cy="485775"/>
           </a:xfrm>
           <a:prstGeom prst="rect">
@@ -10116,150 +10054,6 @@
           </p:grpSp>
         </p:grpSp>
       </p:grpSp>
-      <p:pic>
-        <p:nvPicPr>
-          <p:cNvPr id="64" name="Picture 10" descr="D:\workspace\ruggedsim\manuscript\fitness_landscape_analytic_model.png"/>
-          <p:cNvPicPr>
-            <a:picLocks noChangeAspect="1" noChangeArrowheads="1"/>
-          </p:cNvPicPr>
-          <p:nvPr/>
-        </p:nvPicPr>
-        <p:blipFill>
-          <a:blip r:embed="rId11">
-            <a:extLst>
-              <a:ext uri="{28A0092B-C50C-407E-A947-70E740481C1C}">
-                <a14:useLocalDpi xmlns:a14="http://schemas.microsoft.com/office/drawing/2010/main" val="0"/>
-              </a:ext>
-            </a:extLst>
-          </a:blip>
-          <a:srcRect/>
-          <a:stretch>
-            <a:fillRect/>
-          </a:stretch>
-        </p:blipFill>
-        <p:spPr bwMode="auto">
-          <a:xfrm>
-            <a:off x="3546699" y="32925542"/>
-            <a:ext cx="6480000" cy="6237121"/>
-          </a:xfrm>
-          <a:prstGeom prst="rect">
-            <a:avLst/>
-          </a:prstGeom>
-          <a:noFill/>
-          <a:extLst>
-            <a:ext uri="{909E8E84-426E-40DD-AFC4-6F175D3DCCD1}">
-              <a14:hiddenFill xmlns:a14="http://schemas.microsoft.com/office/drawing/2010/main">
-                <a:solidFill>
-                  <a:srgbClr val="FFFFFF"/>
-                </a:solidFill>
-              </a14:hiddenFill>
-            </a:ext>
-          </a:extLst>
-        </p:spPr>
-      </p:pic>
-      <p:sp>
-        <p:nvSpPr>
-          <p:cNvPr id="65" name="TextBox 64"/>
-          <p:cNvSpPr txBox="1"/>
-          <p:nvPr/>
-        </p:nvSpPr>
-        <p:spPr>
-          <a:xfrm>
-            <a:off x="4338853" y="33096146"/>
-            <a:ext cx="1601147" cy="830989"/>
-          </a:xfrm>
-          <a:prstGeom prst="rect">
-            <a:avLst/>
-          </a:prstGeom>
-          <a:noFill/>
-        </p:spPr>
-        <p:txBody>
-          <a:bodyPr wrap="square" lIns="91431" tIns="45716" rIns="91431" bIns="45716" rtlCol="1">
-            <a:spAutoFit/>
-          </a:bodyPr>
-          <a:lstStyle/>
-          <a:p>
-            <a:pPr algn="ctr" rtl="0"/>
-            <a:r>
-              <a:rPr lang="en-US" sz="4800" dirty="0"/>
-              <a:t>[2]</a:t>
-            </a:r>
-            <a:endParaRPr lang="he-IL" sz="4800" dirty="0"/>
-          </a:p>
-        </p:txBody>
-      </p:sp>
-      <p:pic>
-        <p:nvPicPr>
-          <p:cNvPr id="69" name="Picture 9" descr="D:\workspace\ruggedsim\manuscript\fitness_landscape_stochastic_model.png"/>
-          <p:cNvPicPr>
-            <a:picLocks noChangeAspect="1" noChangeArrowheads="1"/>
-          </p:cNvPicPr>
-          <p:nvPr/>
-        </p:nvPicPr>
-        <p:blipFill>
-          <a:blip r:embed="rId12">
-            <a:extLst>
-              <a:ext uri="{28A0092B-C50C-407E-A947-70E740481C1C}">
-                <a14:useLocalDpi xmlns:a14="http://schemas.microsoft.com/office/drawing/2010/main" val="0"/>
-              </a:ext>
-            </a:extLst>
-          </a:blip>
-          <a:srcRect/>
-          <a:stretch>
-            <a:fillRect/>
-          </a:stretch>
-        </p:blipFill>
-        <p:spPr bwMode="auto">
-          <a:xfrm>
-            <a:off x="11072435" y="30895314"/>
-            <a:ext cx="8100000" cy="8100000"/>
-          </a:xfrm>
-          <a:prstGeom prst="rect">
-            <a:avLst/>
-          </a:prstGeom>
-          <a:noFill/>
-          <a:extLst>
-            <a:ext uri="{909E8E84-426E-40DD-AFC4-6F175D3DCCD1}">
-              <a14:hiddenFill xmlns:a14="http://schemas.microsoft.com/office/drawing/2010/main">
-                <a:solidFill>
-                  <a:srgbClr val="FFFFFF"/>
-                </a:solidFill>
-              </a14:hiddenFill>
-            </a:ext>
-          </a:extLst>
-        </p:spPr>
-      </p:pic>
-      <p:sp>
-        <p:nvSpPr>
-          <p:cNvPr id="72" name="TextBox 71"/>
-          <p:cNvSpPr txBox="1"/>
-          <p:nvPr/>
-        </p:nvSpPr>
-        <p:spPr>
-          <a:xfrm>
-            <a:off x="11035531" y="30837310"/>
-            <a:ext cx="1519159" cy="830989"/>
-          </a:xfrm>
-          <a:prstGeom prst="rect">
-            <a:avLst/>
-          </a:prstGeom>
-          <a:noFill/>
-        </p:spPr>
-        <p:txBody>
-          <a:bodyPr wrap="square" lIns="91431" tIns="45716" rIns="91431" bIns="45716" rtlCol="1">
-            <a:spAutoFit/>
-          </a:bodyPr>
-          <a:lstStyle/>
-          <a:p>
-            <a:pPr rtl="0"/>
-            <a:r>
-              <a:rPr lang="en-US" sz="4800" dirty="0"/>
-              <a:t>[4]</a:t>
-            </a:r>
-            <a:endParaRPr lang="he-IL" sz="4800" dirty="0"/>
-          </a:p>
-        </p:txBody>
-      </p:sp>
       <p:graphicFrame>
         <p:nvGraphicFramePr>
           <p:cNvPr id="73" name="Table 72"/>
@@ -10994,7 +10788,7 @@
           <p:nvPr/>
         </p:nvPicPr>
         <p:blipFill>
-          <a:blip r:embed="rId13">
+          <a:blip r:embed="rId11">
             <a:extLst>
               <a:ext uri="{28A0092B-C50C-407E-A947-70E740481C1C}">
                 <a14:useLocalDpi xmlns:a14="http://schemas.microsoft.com/office/drawing/2010/main" val="0"/>
@@ -11066,7 +10860,7 @@
           <p:nvPr/>
         </p:nvPicPr>
         <p:blipFill>
-          <a:blip r:embed="rId14">
+          <a:blip r:embed="rId12">
             <a:extLst>
               <a:ext uri="{28A0092B-C50C-407E-A947-70E740481C1C}">
                 <a14:useLocalDpi xmlns:a14="http://schemas.microsoft.com/office/drawing/2010/main" val="0"/>
@@ -11138,7 +10932,7 @@
           <p:nvPr/>
         </p:nvPicPr>
         <p:blipFill>
-          <a:blip r:embed="rId15">
+          <a:blip r:embed="rId13">
             <a:extLst>
               <a:ext uri="{28A0092B-C50C-407E-A947-70E740481C1C}">
                 <a14:useLocalDpi xmlns:a14="http://schemas.microsoft.com/office/drawing/2010/main" val="0"/>
@@ -11152,7 +10946,7 @@
         </p:blipFill>
         <p:spPr bwMode="auto">
           <a:xfrm>
-            <a:off x="25869179" y="37246022"/>
+            <a:off x="25749199" y="37246022"/>
             <a:ext cx="2376264" cy="2970330"/>
           </a:xfrm>
           <a:prstGeom prst="rect">
@@ -11173,70 +10967,6 @@
                   <a:srgbClr val="FFFFFF"/>
                 </a:solidFill>
               </a14:hiddenFill>
-            </a:ext>
-          </a:extLst>
-        </p:spPr>
-      </p:pic>
-      <p:pic>
-        <p:nvPicPr>
-          <p:cNvPr id="1029" name="Picture 5"/>
-          <p:cNvPicPr>
-            <a:picLocks noChangeAspect="1" noChangeArrowheads="1"/>
-          </p:cNvPicPr>
-          <p:nvPr/>
-        </p:nvPicPr>
-        <p:blipFill>
-          <a:blip r:embed="rId16" cstate="print">
-            <a:clrChange>
-              <a:clrFrom>
-                <a:srgbClr val="FFFFFF"/>
-              </a:clrFrom>
-              <a:clrTo>
-                <a:srgbClr val="FFFFFF">
-                  <a:alpha val="0"/>
-                </a:srgbClr>
-              </a:clrTo>
-            </a:clrChange>
-            <a:extLst>
-              <a:ext uri="{28A0092B-C50C-407E-A947-70E740481C1C}">
-                <a14:useLocalDpi xmlns:a14="http://schemas.microsoft.com/office/drawing/2010/main" val="0"/>
-              </a:ext>
-            </a:extLst>
-          </a:blip>
-          <a:srcRect/>
-          <a:stretch>
-            <a:fillRect/>
-          </a:stretch>
-        </p:blipFill>
-        <p:spPr bwMode="auto">
-          <a:xfrm>
-            <a:off x="8577938" y="38033228"/>
-            <a:ext cx="793534" cy="1278954"/>
-          </a:xfrm>
-          <a:prstGeom prst="rect">
-            <a:avLst/>
-          </a:prstGeom>
-          <a:noFill/>
-          <a:ln>
-            <a:noFill/>
-          </a:ln>
-          <a:extLst>
-            <a:ext uri="{909E8E84-426E-40DD-AFC4-6F175D3DCCD1}">
-              <a14:hiddenFill xmlns:a14="http://schemas.microsoft.com/office/drawing/2010/main">
-                <a:solidFill>
-                  <a:schemeClr val="accent1"/>
-                </a:solidFill>
-              </a14:hiddenFill>
-            </a:ext>
-            <a:ext uri="{91240B29-F687-4F45-9708-019B960494DF}">
-              <a14:hiddenLine xmlns:a14="http://schemas.microsoft.com/office/drawing/2010/main" w="9525">
-                <a:solidFill>
-                  <a:schemeClr val="tx1"/>
-                </a:solidFill>
-                <a:miter lim="800000"/>
-                <a:headEnd/>
-                <a:tailEnd/>
-              </a14:hiddenLine>
             </a:ext>
           </a:extLst>
         </p:spPr>
@@ -11434,657 +11164,6 @@
           </p:style>
         </p:cxnSp>
       </p:grpSp>
-      <p:grpSp>
-        <p:nvGrpSpPr>
-          <p:cNvPr id="114" name="Group 113"/>
-          <p:cNvGrpSpPr/>
-          <p:nvPr/>
-        </p:nvGrpSpPr>
-        <p:grpSpPr>
-          <a:xfrm>
-            <a:off x="1962523" y="33357590"/>
-            <a:ext cx="2751940" cy="5976664"/>
-            <a:chOff x="1962523" y="33357590"/>
-            <a:chExt cx="2751940" cy="5976664"/>
-          </a:xfrm>
-        </p:grpSpPr>
-        <p:pic>
-          <p:nvPicPr>
-            <p:cNvPr id="81" name="Picture 15" descr="D:\workspace\ruggedsim\manuscript\fitness_landscape_key_vertical.png"/>
-            <p:cNvPicPr>
-              <a:picLocks noChangeAspect="1" noChangeArrowheads="1"/>
-            </p:cNvPicPr>
-            <p:nvPr/>
-          </p:nvPicPr>
-          <p:blipFill rotWithShape="1">
-            <a:blip r:embed="rId17">
-              <a:extLst>
-                <a:ext uri="{28A0092B-C50C-407E-A947-70E740481C1C}">
-                  <a14:useLocalDpi xmlns:a14="http://schemas.microsoft.com/office/drawing/2010/main" val="0"/>
-                </a:ext>
-              </a:extLst>
-            </a:blip>
-            <a:srcRect l="41233" b="35462"/>
-            <a:stretch/>
-          </p:blipFill>
-          <p:spPr bwMode="auto">
-            <a:xfrm>
-              <a:off x="2107938" y="36597950"/>
-              <a:ext cx="2518881" cy="2637163"/>
-            </a:xfrm>
-            <a:prstGeom prst="rect">
-              <a:avLst/>
-            </a:prstGeom>
-            <a:noFill/>
-            <a:extLst>
-              <a:ext uri="{909E8E84-426E-40DD-AFC4-6F175D3DCCD1}">
-                <a14:hiddenFill xmlns:a14="http://schemas.microsoft.com/office/drawing/2010/main">
-                  <a:solidFill>
-                    <a:srgbClr val="FFFFFF"/>
-                  </a:solidFill>
-                </a14:hiddenFill>
-              </a:ext>
-            </a:extLst>
-          </p:spPr>
-        </p:pic>
-        <p:grpSp>
-          <p:nvGrpSpPr>
-            <p:cNvPr id="1028" name="Group 1027"/>
-            <p:cNvGrpSpPr/>
-            <p:nvPr/>
-          </p:nvGrpSpPr>
-          <p:grpSpPr>
-            <a:xfrm>
-              <a:off x="2034531" y="33501606"/>
-              <a:ext cx="1872208" cy="2871808"/>
-              <a:chOff x="2106539" y="34446222"/>
-              <a:chExt cx="1872208" cy="2871808"/>
-            </a:xfrm>
-          </p:grpSpPr>
-          <p:pic>
-            <p:nvPicPr>
-              <p:cNvPr id="80" name="Picture 15" descr="D:\workspace\ruggedsim\manuscript\fitness_landscape_key_vertical.png"/>
-              <p:cNvPicPr>
-                <a:picLocks noChangeAspect="1" noChangeArrowheads="1"/>
-              </p:cNvPicPr>
-              <p:nvPr/>
-            </p:nvPicPr>
-            <p:blipFill rotWithShape="1">
-              <a:blip r:embed="rId18">
-                <a:extLst>
-                  <a:ext uri="{28A0092B-C50C-407E-A947-70E740481C1C}">
-                    <a14:useLocalDpi xmlns:a14="http://schemas.microsoft.com/office/drawing/2010/main" val="0"/>
-                  </a:ext>
-                </a:extLst>
-              </a:blip>
-              <a:srcRect t="38941" r="56795" b="37231"/>
-              <a:stretch/>
-            </p:blipFill>
-            <p:spPr bwMode="auto">
-              <a:xfrm>
-                <a:off x="2126882" y="35301806"/>
-                <a:ext cx="1851865" cy="973669"/>
-              </a:xfrm>
-              <a:prstGeom prst="rect">
-                <a:avLst/>
-              </a:prstGeom>
-              <a:noFill/>
-              <a:extLst>
-                <a:ext uri="{909E8E84-426E-40DD-AFC4-6F175D3DCCD1}">
-                  <a14:hiddenFill xmlns:a14="http://schemas.microsoft.com/office/drawing/2010/main">
-                    <a:solidFill>
-                      <a:srgbClr val="FFFFFF"/>
-                    </a:solidFill>
-                  </a14:hiddenFill>
-                </a:ext>
-              </a:extLst>
-            </p:spPr>
-          </p:pic>
-          <p:pic>
-            <p:nvPicPr>
-              <p:cNvPr id="82" name="Picture 15" descr="D:\workspace\ruggedsim\manuscript\fitness_landscape_key_vertical.png"/>
-              <p:cNvPicPr>
-                <a:picLocks noChangeAspect="1" noChangeArrowheads="1"/>
-              </p:cNvPicPr>
-              <p:nvPr/>
-            </p:nvPicPr>
-            <p:blipFill rotWithShape="1">
-              <a:blip r:embed="rId18">
-                <a:extLst>
-                  <a:ext uri="{28A0092B-C50C-407E-A947-70E740481C1C}">
-                    <a14:useLocalDpi xmlns:a14="http://schemas.microsoft.com/office/drawing/2010/main" val="0"/>
-                  </a:ext>
-                </a:extLst>
-              </a:blip>
-              <a:srcRect r="56795" b="76887"/>
-              <a:stretch/>
-            </p:blipFill>
-            <p:spPr bwMode="auto">
-              <a:xfrm>
-                <a:off x="2114923" y="34446222"/>
-                <a:ext cx="1851865" cy="944445"/>
-              </a:xfrm>
-              <a:prstGeom prst="rect">
-                <a:avLst/>
-              </a:prstGeom>
-              <a:noFill/>
-              <a:extLst>
-                <a:ext uri="{909E8E84-426E-40DD-AFC4-6F175D3DCCD1}">
-                  <a14:hiddenFill xmlns:a14="http://schemas.microsoft.com/office/drawing/2010/main">
-                    <a:solidFill>
-                      <a:srgbClr val="FFFFFF"/>
-                    </a:solidFill>
-                  </a14:hiddenFill>
-                </a:ext>
-              </a:extLst>
-            </p:spPr>
-          </p:pic>
-          <p:pic>
-            <p:nvPicPr>
-              <p:cNvPr id="83" name="Picture 15" descr="D:\workspace\ruggedsim\manuscript\fitness_landscape_key_vertical.png"/>
-              <p:cNvPicPr>
-                <a:picLocks noChangeAspect="1" noChangeArrowheads="1"/>
-              </p:cNvPicPr>
-              <p:nvPr/>
-            </p:nvPicPr>
-            <p:blipFill rotWithShape="1">
-              <a:blip r:embed="rId18">
-                <a:extLst>
-                  <a:ext uri="{28A0092B-C50C-407E-A947-70E740481C1C}">
-                    <a14:useLocalDpi xmlns:a14="http://schemas.microsoft.com/office/drawing/2010/main" val="0"/>
-                  </a:ext>
-                </a:extLst>
-              </a:blip>
-              <a:srcRect t="76020" r="56795"/>
-              <a:stretch/>
-            </p:blipFill>
-            <p:spPr bwMode="auto">
-              <a:xfrm>
-                <a:off x="2106539" y="36338147"/>
-                <a:ext cx="1851865" cy="979883"/>
-              </a:xfrm>
-              <a:prstGeom prst="rect">
-                <a:avLst/>
-              </a:prstGeom>
-              <a:noFill/>
-              <a:extLst>
-                <a:ext uri="{909E8E84-426E-40DD-AFC4-6F175D3DCCD1}">
-                  <a14:hiddenFill xmlns:a14="http://schemas.microsoft.com/office/drawing/2010/main">
-                    <a:solidFill>
-                      <a:srgbClr val="FFFFFF"/>
-                    </a:solidFill>
-                  </a14:hiddenFill>
-                </a:ext>
-              </a:extLst>
-            </p:spPr>
-          </p:pic>
-        </p:grpSp>
-        <p:grpSp>
-          <p:nvGrpSpPr>
-            <p:cNvPr id="113" name="Group 112"/>
-            <p:cNvGrpSpPr/>
-            <p:nvPr/>
-          </p:nvGrpSpPr>
-          <p:grpSpPr>
-            <a:xfrm>
-              <a:off x="1962523" y="33357590"/>
-              <a:ext cx="2751940" cy="5976664"/>
-              <a:chOff x="1962523" y="33357590"/>
-              <a:chExt cx="2751940" cy="5976664"/>
-            </a:xfrm>
-          </p:grpSpPr>
-          <p:cxnSp>
-            <p:nvCxnSpPr>
-              <p:cNvPr id="101" name="Straight Connector 100"/>
-              <p:cNvCxnSpPr/>
-              <p:nvPr/>
-            </p:nvCxnSpPr>
-            <p:spPr>
-              <a:xfrm flipV="1">
-                <a:off x="1962523" y="33357590"/>
-                <a:ext cx="50076" cy="5961930"/>
-              </a:xfrm>
-              <a:prstGeom prst="line">
-                <a:avLst/>
-              </a:prstGeom>
-              <a:ln>
-                <a:prstDash val="dash"/>
-              </a:ln>
-            </p:spPr>
-            <p:style>
-              <a:lnRef idx="1">
-                <a:schemeClr val="dk1"/>
-              </a:lnRef>
-              <a:fillRef idx="0">
-                <a:schemeClr val="dk1"/>
-              </a:fillRef>
-              <a:effectRef idx="0">
-                <a:schemeClr val="dk1"/>
-              </a:effectRef>
-              <a:fontRef idx="minor">
-                <a:schemeClr val="tx1"/>
-              </a:fontRef>
-            </p:style>
-          </p:cxnSp>
-          <p:cxnSp>
-            <p:nvCxnSpPr>
-              <p:cNvPr id="106" name="Straight Connector 105"/>
-              <p:cNvCxnSpPr/>
-              <p:nvPr/>
-            </p:nvCxnSpPr>
-            <p:spPr>
-              <a:xfrm flipV="1">
-                <a:off x="3906739" y="33357590"/>
-                <a:ext cx="14599" cy="3168000"/>
-              </a:xfrm>
-              <a:prstGeom prst="line">
-                <a:avLst/>
-              </a:prstGeom>
-              <a:ln>
-                <a:prstDash val="dash"/>
-              </a:ln>
-            </p:spPr>
-            <p:style>
-              <a:lnRef idx="1">
-                <a:schemeClr val="dk1"/>
-              </a:lnRef>
-              <a:fillRef idx="0">
-                <a:schemeClr val="dk1"/>
-              </a:fillRef>
-              <a:effectRef idx="0">
-                <a:schemeClr val="dk1"/>
-              </a:effectRef>
-              <a:fontRef idx="minor">
-                <a:schemeClr val="tx1"/>
-              </a:fontRef>
-            </p:style>
-          </p:cxnSp>
-          <p:cxnSp>
-            <p:nvCxnSpPr>
-              <p:cNvPr id="107" name="Straight Connector 106"/>
-              <p:cNvCxnSpPr/>
-              <p:nvPr/>
-            </p:nvCxnSpPr>
-            <p:spPr>
-              <a:xfrm flipV="1">
-                <a:off x="4698827" y="36634254"/>
-                <a:ext cx="14599" cy="2700000"/>
-              </a:xfrm>
-              <a:prstGeom prst="line">
-                <a:avLst/>
-              </a:prstGeom>
-              <a:ln>
-                <a:prstDash val="dash"/>
-              </a:ln>
-            </p:spPr>
-            <p:style>
-              <a:lnRef idx="1">
-                <a:schemeClr val="dk1"/>
-              </a:lnRef>
-              <a:fillRef idx="0">
-                <a:schemeClr val="dk1"/>
-              </a:fillRef>
-              <a:effectRef idx="0">
-                <a:schemeClr val="dk1"/>
-              </a:effectRef>
-              <a:fontRef idx="minor">
-                <a:schemeClr val="tx1"/>
-              </a:fontRef>
-            </p:style>
-          </p:cxnSp>
-          <p:cxnSp>
-            <p:nvCxnSpPr>
-              <p:cNvPr id="112" name="Straight Connector 111"/>
-              <p:cNvCxnSpPr/>
-              <p:nvPr/>
-            </p:nvCxnSpPr>
-            <p:spPr>
-              <a:xfrm>
-                <a:off x="1962523" y="39334254"/>
-                <a:ext cx="2751940" cy="0"/>
-              </a:xfrm>
-              <a:prstGeom prst="line">
-                <a:avLst/>
-              </a:prstGeom>
-              <a:ln>
-                <a:prstDash val="dash"/>
-              </a:ln>
-            </p:spPr>
-            <p:style>
-              <a:lnRef idx="1">
-                <a:schemeClr val="dk1"/>
-              </a:lnRef>
-              <a:fillRef idx="0">
-                <a:schemeClr val="dk1"/>
-              </a:fillRef>
-              <a:effectRef idx="0">
-                <a:schemeClr val="dk1"/>
-              </a:effectRef>
-              <a:fontRef idx="minor">
-                <a:schemeClr val="tx1"/>
-              </a:fontRef>
-            </p:style>
-          </p:cxnSp>
-          <p:cxnSp>
-            <p:nvCxnSpPr>
-              <p:cNvPr id="115" name="Straight Connector 114"/>
-              <p:cNvCxnSpPr/>
-              <p:nvPr/>
-            </p:nvCxnSpPr>
-            <p:spPr>
-              <a:xfrm>
-                <a:off x="3906739" y="36606334"/>
-                <a:ext cx="799387" cy="0"/>
-              </a:xfrm>
-              <a:prstGeom prst="line">
-                <a:avLst/>
-              </a:prstGeom>
-              <a:ln>
-                <a:prstDash val="dash"/>
-              </a:ln>
-            </p:spPr>
-            <p:style>
-              <a:lnRef idx="1">
-                <a:schemeClr val="dk1"/>
-              </a:lnRef>
-              <a:fillRef idx="0">
-                <a:schemeClr val="dk1"/>
-              </a:fillRef>
-              <a:effectRef idx="0">
-                <a:schemeClr val="dk1"/>
-              </a:effectRef>
-              <a:fontRef idx="minor">
-                <a:schemeClr val="tx1"/>
-              </a:fontRef>
-            </p:style>
-          </p:cxnSp>
-          <p:cxnSp>
-            <p:nvCxnSpPr>
-              <p:cNvPr id="118" name="Straight Connector 117"/>
-              <p:cNvCxnSpPr/>
-              <p:nvPr/>
-            </p:nvCxnSpPr>
-            <p:spPr>
-              <a:xfrm>
-                <a:off x="2034531" y="33357590"/>
-                <a:ext cx="1872000" cy="0"/>
-              </a:xfrm>
-              <a:prstGeom prst="line">
-                <a:avLst/>
-              </a:prstGeom>
-              <a:ln>
-                <a:prstDash val="dash"/>
-              </a:ln>
-            </p:spPr>
-            <p:style>
-              <a:lnRef idx="1">
-                <a:schemeClr val="dk1"/>
-              </a:lnRef>
-              <a:fillRef idx="0">
-                <a:schemeClr val="dk1"/>
-              </a:fillRef>
-              <a:effectRef idx="0">
-                <a:schemeClr val="dk1"/>
-              </a:effectRef>
-              <a:fontRef idx="minor">
-                <a:schemeClr val="tx1"/>
-              </a:fontRef>
-            </p:style>
-          </p:cxnSp>
-        </p:grpSp>
-      </p:grpSp>
-      <p:grpSp>
-        <p:nvGrpSpPr>
-          <p:cNvPr id="117" name="Group 116"/>
-          <p:cNvGrpSpPr/>
-          <p:nvPr/>
-        </p:nvGrpSpPr>
-        <p:grpSpPr>
-          <a:xfrm>
-            <a:off x="10747499" y="39550278"/>
-            <a:ext cx="8352928" cy="1224136"/>
-            <a:chOff x="10747499" y="39550278"/>
-            <a:chExt cx="8352928" cy="1224136"/>
-          </a:xfrm>
-        </p:grpSpPr>
-        <p:pic>
-          <p:nvPicPr>
-            <p:cNvPr id="75" name="Picture 11"/>
-            <p:cNvPicPr>
-              <a:picLocks noChangeAspect="1" noChangeArrowheads="1"/>
-            </p:cNvPicPr>
-            <p:nvPr/>
-          </p:nvPicPr>
-          <p:blipFill>
-            <a:blip r:embed="rId19">
-              <a:extLst>
-                <a:ext uri="{28A0092B-C50C-407E-A947-70E740481C1C}">
-                  <a14:useLocalDpi xmlns:a14="http://schemas.microsoft.com/office/drawing/2010/main" val="0"/>
-                </a:ext>
-              </a:extLst>
-            </a:blip>
-            <a:stretch>
-              <a:fillRect/>
-            </a:stretch>
-          </p:blipFill>
-          <p:spPr bwMode="auto">
-            <a:xfrm>
-              <a:off x="11180427" y="39957271"/>
-              <a:ext cx="7920000" cy="817143"/>
-            </a:xfrm>
-            <a:prstGeom prst="rect">
-              <a:avLst/>
-            </a:prstGeom>
-            <a:noFill/>
-            <a:extLst>
-              <a:ext uri="{909E8E84-426E-40DD-AFC4-6F175D3DCCD1}">
-                <a14:hiddenFill xmlns:a14="http://schemas.microsoft.com/office/drawing/2010/main">
-                  <a:solidFill>
-                    <a:srgbClr val="FFFFFF"/>
-                  </a:solidFill>
-                </a14:hiddenFill>
-              </a:ext>
-            </a:extLst>
-          </p:spPr>
-        </p:pic>
-        <p:sp>
-          <p:nvSpPr>
-            <p:cNvPr id="76" name="TextBox 75"/>
-            <p:cNvSpPr txBox="1"/>
-            <p:nvPr/>
-          </p:nvSpPr>
-          <p:spPr>
-            <a:xfrm>
-              <a:off x="10747499" y="39550278"/>
-              <a:ext cx="3148167" cy="523212"/>
-            </a:xfrm>
-            <a:prstGeom prst="rect">
-              <a:avLst/>
-            </a:prstGeom>
-            <a:noFill/>
-          </p:spPr>
-          <p:txBody>
-            <a:bodyPr wrap="square" lIns="91431" tIns="45716" rIns="91431" bIns="45716" rtlCol="1">
-              <a:spAutoFit/>
-            </a:bodyPr>
-            <a:lstStyle/>
-            <a:p>
-              <a:pPr algn="ctr"/>
-              <a:r>
-                <a:rPr lang="en-US" sz="2800" dirty="0"/>
-                <a:t>fitness</a:t>
-              </a:r>
-              <a:endParaRPr lang="he-IL" sz="2800" dirty="0"/>
-            </a:p>
-          </p:txBody>
-        </p:sp>
-        <p:sp>
-          <p:nvSpPr>
-            <p:cNvPr id="116" name="Rectangle 115"/>
-            <p:cNvSpPr/>
-            <p:nvPr/>
-          </p:nvSpPr>
-          <p:spPr>
-            <a:xfrm>
-              <a:off x="11795109" y="40032000"/>
-              <a:ext cx="6912000" cy="342000"/>
-            </a:xfrm>
-            <a:prstGeom prst="rect">
-              <a:avLst/>
-            </a:prstGeom>
-            <a:noFill/>
-            <a:ln w="3175"/>
-          </p:spPr>
-          <p:style>
-            <a:lnRef idx="2">
-              <a:schemeClr val="dk1"/>
-            </a:lnRef>
-            <a:fillRef idx="1">
-              <a:schemeClr val="lt1"/>
-            </a:fillRef>
-            <a:effectRef idx="0">
-              <a:schemeClr val="dk1"/>
-            </a:effectRef>
-            <a:fontRef idx="minor">
-              <a:schemeClr val="dk1"/>
-            </a:fontRef>
-          </p:style>
-          <p:txBody>
-            <a:bodyPr rtlCol="1" anchor="ctr"/>
-            <a:lstStyle/>
-            <a:p>
-              <a:pPr algn="ctr"/>
-              <a:endParaRPr lang="he-IL" dirty="0"/>
-            </a:p>
-          </p:txBody>
-        </p:sp>
-      </p:grpSp>
-      <p:grpSp>
-        <p:nvGrpSpPr>
-          <p:cNvPr id="123" name="Group 122"/>
-          <p:cNvGrpSpPr/>
-          <p:nvPr/>
-        </p:nvGrpSpPr>
-        <p:grpSpPr>
-          <a:xfrm>
-            <a:off x="1386459" y="39549600"/>
-            <a:ext cx="8352928" cy="1224136"/>
-            <a:chOff x="10747499" y="39550278"/>
-            <a:chExt cx="8352928" cy="1224136"/>
-          </a:xfrm>
-        </p:grpSpPr>
-        <p:pic>
-          <p:nvPicPr>
-            <p:cNvPr id="124" name="Picture 11"/>
-            <p:cNvPicPr>
-              <a:picLocks noChangeAspect="1" noChangeArrowheads="1"/>
-            </p:cNvPicPr>
-            <p:nvPr/>
-          </p:nvPicPr>
-          <p:blipFill>
-            <a:blip r:embed="rId19">
-              <a:extLst>
-                <a:ext uri="{28A0092B-C50C-407E-A947-70E740481C1C}">
-                  <a14:useLocalDpi xmlns:a14="http://schemas.microsoft.com/office/drawing/2010/main" val="0"/>
-                </a:ext>
-              </a:extLst>
-            </a:blip>
-            <a:stretch>
-              <a:fillRect/>
-            </a:stretch>
-          </p:blipFill>
-          <p:spPr bwMode="auto">
-            <a:xfrm>
-              <a:off x="11180427" y="39957271"/>
-              <a:ext cx="7920000" cy="817143"/>
-            </a:xfrm>
-            <a:prstGeom prst="rect">
-              <a:avLst/>
-            </a:prstGeom>
-            <a:noFill/>
-            <a:extLst>
-              <a:ext uri="{909E8E84-426E-40DD-AFC4-6F175D3DCCD1}">
-                <a14:hiddenFill xmlns:a14="http://schemas.microsoft.com/office/drawing/2010/main">
-                  <a:solidFill>
-                    <a:srgbClr val="FFFFFF"/>
-                  </a:solidFill>
-                </a14:hiddenFill>
-              </a:ext>
-            </a:extLst>
-          </p:spPr>
-        </p:pic>
-        <p:sp>
-          <p:nvSpPr>
-            <p:cNvPr id="125" name="TextBox 124"/>
-            <p:cNvSpPr txBox="1"/>
-            <p:nvPr/>
-          </p:nvSpPr>
-          <p:spPr>
-            <a:xfrm>
-              <a:off x="10747499" y="39550278"/>
-              <a:ext cx="3148167" cy="523212"/>
-            </a:xfrm>
-            <a:prstGeom prst="rect">
-              <a:avLst/>
-            </a:prstGeom>
-            <a:noFill/>
-          </p:spPr>
-          <p:txBody>
-            <a:bodyPr wrap="square" lIns="91431" tIns="45716" rIns="91431" bIns="45716" rtlCol="1">
-              <a:spAutoFit/>
-            </a:bodyPr>
-            <a:lstStyle/>
-            <a:p>
-              <a:pPr algn="ctr"/>
-              <a:r>
-                <a:rPr lang="en-US" sz="2800" dirty="0"/>
-                <a:t>fitness</a:t>
-              </a:r>
-              <a:endParaRPr lang="he-IL" sz="2800" dirty="0"/>
-            </a:p>
-          </p:txBody>
-        </p:sp>
-        <p:sp>
-          <p:nvSpPr>
-            <p:cNvPr id="126" name="Rectangle 125"/>
-            <p:cNvSpPr/>
-            <p:nvPr/>
-          </p:nvSpPr>
-          <p:spPr>
-            <a:xfrm>
-              <a:off x="11795109" y="40032000"/>
-              <a:ext cx="6912000" cy="342000"/>
-            </a:xfrm>
-            <a:prstGeom prst="rect">
-              <a:avLst/>
-            </a:prstGeom>
-            <a:noFill/>
-            <a:ln w="3175"/>
-          </p:spPr>
-          <p:style>
-            <a:lnRef idx="2">
-              <a:schemeClr val="dk1"/>
-            </a:lnRef>
-            <a:fillRef idx="1">
-              <a:schemeClr val="lt1"/>
-            </a:fillRef>
-            <a:effectRef idx="0">
-              <a:schemeClr val="dk1"/>
-            </a:effectRef>
-            <a:fontRef idx="minor">
-              <a:schemeClr val="dk1"/>
-            </a:fontRef>
-          </p:style>
-          <p:txBody>
-            <a:bodyPr rtlCol="1" anchor="ctr"/>
-            <a:lstStyle/>
-            <a:p>
-              <a:pPr algn="ctr"/>
-              <a:endParaRPr lang="he-IL" dirty="0"/>
-            </a:p>
-          </p:txBody>
-        </p:sp>
-      </p:grpSp>
       <p:pic>
         <p:nvPicPr>
           <p:cNvPr id="1027" name="Picture 3"/>
@@ -12094,7 +11173,7 @@
           <p:nvPr/>
         </p:nvPicPr>
         <p:blipFill>
-          <a:blip r:embed="rId20">
+          <a:blip r:embed="rId14">
             <a:extLst>
               <a:ext uri="{28A0092B-C50C-407E-A947-70E740481C1C}">
                 <a14:useLocalDpi xmlns:a14="http://schemas.microsoft.com/office/drawing/2010/main" val="0"/>
@@ -12108,7 +11187,7 @@
         </p:blipFill>
         <p:spPr bwMode="auto">
           <a:xfrm>
-            <a:off x="22916851" y="39694294"/>
+            <a:off x="22196771" y="39694294"/>
             <a:ext cx="1080000" cy="1080000"/>
           </a:xfrm>
           <a:prstGeom prst="rect">
@@ -12148,7 +11227,7 @@
           <p:nvPr/>
         </p:nvPicPr>
         <p:blipFill>
-          <a:blip r:embed="rId21" cstate="print">
+          <a:blip r:embed="rId15" cstate="print">
             <a:extLst>
               <a:ext uri="{28A0092B-C50C-407E-A947-70E740481C1C}">
                 <a14:useLocalDpi xmlns:a14="http://schemas.microsoft.com/office/drawing/2010/main" val="0"/>
@@ -12162,7 +11241,7 @@
         </p:blipFill>
         <p:spPr bwMode="auto">
           <a:xfrm>
-            <a:off x="21692715" y="39694294"/>
+            <a:off x="20684603" y="39694294"/>
             <a:ext cx="1113383" cy="1080000"/>
           </a:xfrm>
           <a:prstGeom prst="rect">
@@ -12254,7 +11333,7 @@
             <p:nvPr/>
           </p:nvPicPr>
           <p:blipFill rotWithShape="1">
-            <a:blip r:embed="rId22">
+            <a:blip r:embed="rId16">
               <a:clrChange>
                 <a:clrFrom>
                   <a:srgbClr val="FFFFFF"/>
@@ -12344,7 +11423,7 @@
         </p:nvSpPr>
         <p:spPr>
           <a:xfrm>
-            <a:off x="20324563" y="19503533"/>
+            <a:off x="20324563" y="19719557"/>
             <a:ext cx="324000" cy="4276993"/>
           </a:xfrm>
           <a:prstGeom prst="rect">
@@ -12391,8 +11470,8 @@
         </p:nvSpPr>
         <p:spPr>
           <a:xfrm rot="16200000">
-            <a:off x="17592384" y="21400138"/>
-            <a:ext cx="5751229" cy="430887"/>
+            <a:off x="17341516" y="21661575"/>
+            <a:ext cx="6399302" cy="430887"/>
           </a:xfrm>
           <a:prstGeom prst="rect">
             <a:avLst/>
@@ -12439,45 +11518,14 @@
       </p:sp>
       <p:sp>
         <p:nvSpPr>
-          <p:cNvPr id="1025" name="TextBox 1024"/>
-          <p:cNvSpPr txBox="1"/>
-          <p:nvPr/>
-        </p:nvSpPr>
-        <p:spPr>
-          <a:xfrm>
-            <a:off x="20252555" y="39766182"/>
-            <a:ext cx="1440160" cy="830997"/>
-          </a:xfrm>
-          <a:prstGeom prst="rect">
-            <a:avLst/>
-          </a:prstGeom>
-          <a:noFill/>
-        </p:spPr>
-        <p:txBody>
-          <a:bodyPr wrap="square" rtlCol="1">
-            <a:spAutoFit/>
-          </a:bodyPr>
-          <a:lstStyle/>
-          <a:p>
-            <a:pPr algn="ctr"/>
-            <a:r>
-              <a:rPr lang="en-US" sz="1600" b="1" dirty="0"/>
-              <a:t>Manna Center for Plant Biosciences</a:t>
-            </a:r>
-            <a:endParaRPr lang="he-IL" sz="1600" dirty="0"/>
-          </a:p>
-        </p:txBody>
-      </p:sp>
-      <p:sp>
-        <p:nvSpPr>
           <p:cNvPr id="1032" name="TextBox 1031"/>
           <p:cNvSpPr txBox="1"/>
           <p:nvPr/>
         </p:nvSpPr>
         <p:spPr>
           <a:xfrm>
-            <a:off x="810395" y="185709"/>
-            <a:ext cx="16461622" cy="1200329"/>
+            <a:off x="810395" y="89894"/>
+            <a:ext cx="1220206" cy="769441"/>
           </a:xfrm>
           <a:prstGeom prst="rect">
             <a:avLst/>
@@ -12492,21 +11540,10 @@
           <a:p>
             <a:pPr algn="l" rtl="0"/>
             <a:r>
-              <a:rPr lang="en-US" sz="3600" b="1" dirty="0" smtClean="0"/>
-              <a:t>D21SY13PS0001</a:t>
-            </a:r>
-            <a:r>
-              <a:rPr lang="en-US" sz="3600" dirty="0" smtClean="0"/>
-              <a:t> | Poster #1 | Wed. 21 | SY13</a:t>
-            </a:r>
-            <a:r>
-              <a:rPr lang="en-US" sz="3600" dirty="0"/>
-              <a:t>: Rapid evolution and population genetics</a:t>
-            </a:r>
-            <a:br>
-              <a:rPr lang="en-US" sz="3600" dirty="0"/>
-            </a:br>
-            <a:endParaRPr lang="he-IL" sz="3600" dirty="0"/>
+              <a:rPr lang="en-US" sz="4400" dirty="0" smtClean="0"/>
+              <a:t>P-93</a:t>
+            </a:r>
+            <a:endParaRPr lang="he-IL" sz="4400" dirty="0"/>
           </a:p>
         </p:txBody>
       </p:sp>
@@ -12556,7 +11593,7 @@
         </p:nvSpPr>
         <p:spPr>
           <a:xfrm>
-            <a:off x="20252555" y="25004662"/>
+            <a:off x="20252555" y="25099317"/>
             <a:ext cx="7920880" cy="769441"/>
           </a:xfrm>
           <a:prstGeom prst="rect">
@@ -12630,6 +11667,499 @@
               </a:rPr>
               <a:t>)</a:t>
             </a:r>
+          </a:p>
+        </p:txBody>
+      </p:sp>
+      <p:grpSp>
+        <p:nvGrpSpPr>
+          <p:cNvPr id="24" name="Group 23"/>
+          <p:cNvGrpSpPr/>
+          <p:nvPr/>
+        </p:nvGrpSpPr>
+        <p:grpSpPr>
+          <a:xfrm>
+            <a:off x="1877985" y="33717630"/>
+            <a:ext cx="7789394" cy="5972236"/>
+            <a:chOff x="2003285" y="33805218"/>
+            <a:chExt cx="7789394" cy="5972236"/>
+          </a:xfrm>
+        </p:grpSpPr>
+        <p:pic>
+          <p:nvPicPr>
+            <p:cNvPr id="6" name="Picture 3"/>
+            <p:cNvPicPr>
+              <a:picLocks noChangeAspect="1" noChangeArrowheads="1"/>
+            </p:cNvPicPr>
+            <p:nvPr/>
+          </p:nvPicPr>
+          <p:blipFill>
+            <a:blip r:embed="rId17">
+              <a:extLst>
+                <a:ext uri="{28A0092B-C50C-407E-A947-70E740481C1C}">
+                  <a14:useLocalDpi xmlns:a14="http://schemas.microsoft.com/office/drawing/2010/main" val="0"/>
+                </a:ext>
+              </a:extLst>
+            </a:blip>
+            <a:srcRect/>
+            <a:stretch>
+              <a:fillRect/>
+            </a:stretch>
+          </p:blipFill>
+          <p:spPr bwMode="auto">
+            <a:xfrm>
+              <a:off x="2003285" y="33805218"/>
+              <a:ext cx="7789394" cy="5889076"/>
+            </a:xfrm>
+            <a:prstGeom prst="rect">
+              <a:avLst/>
+            </a:prstGeom>
+            <a:noFill/>
+            <a:ln>
+              <a:noFill/>
+            </a:ln>
+            <a:effectLst/>
+            <a:extLst>
+              <a:ext uri="{909E8E84-426E-40DD-AFC4-6F175D3DCCD1}">
+                <a14:hiddenFill xmlns:a14="http://schemas.microsoft.com/office/drawing/2010/main">
+                  <a:solidFill>
+                    <a:schemeClr val="accent1"/>
+                  </a:solidFill>
+                </a14:hiddenFill>
+              </a:ext>
+              <a:ext uri="{91240B29-F687-4F45-9708-019B960494DF}">
+                <a14:hiddenLine xmlns:a14="http://schemas.microsoft.com/office/drawing/2010/main" w="9525">
+                  <a:solidFill>
+                    <a:schemeClr val="tx1"/>
+                  </a:solidFill>
+                  <a:miter lim="800000"/>
+                  <a:headEnd/>
+                  <a:tailEnd/>
+                </a14:hiddenLine>
+              </a:ext>
+              <a:ext uri="{AF507438-7753-43E0-B8FC-AC1667EBCBE1}">
+                <a14:hiddenEffects xmlns:a14="http://schemas.microsoft.com/office/drawing/2010/main">
+                  <a:effectLst>
+                    <a:outerShdw dist="35921" dir="2700000" algn="ctr" rotWithShape="0">
+                      <a:schemeClr val="bg2"/>
+                    </a:outerShdw>
+                  </a:effectLst>
+                </a14:hiddenEffects>
+              </a:ext>
+            </a:extLst>
+          </p:spPr>
+        </p:pic>
+        <p:sp>
+          <p:nvSpPr>
+            <p:cNvPr id="17" name="Rectangle 16"/>
+            <p:cNvSpPr/>
+            <p:nvPr/>
+          </p:nvSpPr>
+          <p:spPr>
+            <a:xfrm>
+              <a:off x="2034531" y="38887472"/>
+              <a:ext cx="511883" cy="889982"/>
+            </a:xfrm>
+            <a:prstGeom prst="rect">
+              <a:avLst/>
+            </a:prstGeom>
+            <a:ln>
+              <a:noFill/>
+            </a:ln>
+          </p:spPr>
+          <p:style>
+            <a:lnRef idx="2">
+              <a:schemeClr val="accent1"/>
+            </a:lnRef>
+            <a:fillRef idx="1">
+              <a:schemeClr val="lt1"/>
+            </a:fillRef>
+            <a:effectRef idx="0">
+              <a:schemeClr val="accent1"/>
+            </a:effectRef>
+            <a:fontRef idx="minor">
+              <a:schemeClr val="dk1"/>
+            </a:fontRef>
+          </p:style>
+          <p:txBody>
+            <a:bodyPr rtlCol="1" anchor="ctr"/>
+            <a:lstStyle/>
+            <a:p>
+              <a:pPr algn="ctr"/>
+              <a:endParaRPr lang="he-IL"/>
+            </a:p>
+          </p:txBody>
+        </p:sp>
+      </p:grpSp>
+      <p:pic>
+        <p:nvPicPr>
+          <p:cNvPr id="1029" name="Picture 5"/>
+          <p:cNvPicPr>
+            <a:picLocks noChangeAspect="1" noChangeArrowheads="1"/>
+          </p:cNvPicPr>
+          <p:nvPr/>
+        </p:nvPicPr>
+        <p:blipFill>
+          <a:blip r:embed="rId18" cstate="print">
+            <a:clrChange>
+              <a:clrFrom>
+                <a:srgbClr val="FFFFFF"/>
+              </a:clrFrom>
+              <a:clrTo>
+                <a:srgbClr val="FFFFFF">
+                  <a:alpha val="0"/>
+                </a:srgbClr>
+              </a:clrTo>
+            </a:clrChange>
+            <a:extLst>
+              <a:ext uri="{28A0092B-C50C-407E-A947-70E740481C1C}">
+                <a14:useLocalDpi xmlns:a14="http://schemas.microsoft.com/office/drawing/2010/main" val="0"/>
+              </a:ext>
+            </a:extLst>
+          </a:blip>
+          <a:srcRect/>
+          <a:stretch>
+            <a:fillRect/>
+          </a:stretch>
+        </p:blipFill>
+        <p:spPr bwMode="auto">
+          <a:xfrm>
+            <a:off x="9161877" y="38326142"/>
+            <a:ext cx="793534" cy="1278954"/>
+          </a:xfrm>
+          <a:prstGeom prst="rect">
+            <a:avLst/>
+          </a:prstGeom>
+          <a:noFill/>
+          <a:ln>
+            <a:noFill/>
+          </a:ln>
+          <a:extLst>
+            <a:ext uri="{909E8E84-426E-40DD-AFC4-6F175D3DCCD1}">
+              <a14:hiddenFill xmlns:a14="http://schemas.microsoft.com/office/drawing/2010/main">
+                <a:solidFill>
+                  <a:schemeClr val="accent1"/>
+                </a:solidFill>
+              </a14:hiddenFill>
+            </a:ext>
+            <a:ext uri="{91240B29-F687-4F45-9708-019B960494DF}">
+              <a14:hiddenLine xmlns:a14="http://schemas.microsoft.com/office/drawing/2010/main" w="9525">
+                <a:solidFill>
+                  <a:schemeClr val="tx1"/>
+                </a:solidFill>
+                <a:miter lim="800000"/>
+                <a:headEnd/>
+                <a:tailEnd/>
+              </a14:hiddenLine>
+            </a:ext>
+          </a:extLst>
+        </p:spPr>
+      </p:pic>
+      <p:sp>
+        <p:nvSpPr>
+          <p:cNvPr id="65" name="TextBox 64"/>
+          <p:cNvSpPr txBox="1"/>
+          <p:nvPr/>
+        </p:nvSpPr>
+        <p:spPr>
+          <a:xfrm>
+            <a:off x="1602483" y="33488936"/>
+            <a:ext cx="1601147" cy="830989"/>
+          </a:xfrm>
+          <a:prstGeom prst="rect">
+            <a:avLst/>
+          </a:prstGeom>
+          <a:noFill/>
+        </p:spPr>
+        <p:txBody>
+          <a:bodyPr wrap="square" lIns="91431" tIns="45716" rIns="91431" bIns="45716" rtlCol="1">
+            <a:spAutoFit/>
+          </a:bodyPr>
+          <a:lstStyle/>
+          <a:p>
+            <a:pPr algn="ctr" rtl="0"/>
+            <a:r>
+              <a:rPr lang="en-US" sz="4800" dirty="0"/>
+              <a:t>[2]</a:t>
+            </a:r>
+            <a:endParaRPr lang="he-IL" sz="4800" dirty="0"/>
+          </a:p>
+        </p:txBody>
+      </p:sp>
+      <p:sp>
+        <p:nvSpPr>
+          <p:cNvPr id="29" name="TextBox 28"/>
+          <p:cNvSpPr txBox="1"/>
+          <p:nvPr/>
+        </p:nvSpPr>
+        <p:spPr>
+          <a:xfrm rot="16200000">
+            <a:off x="1232333" y="36083784"/>
+            <a:ext cx="1925527" cy="830997"/>
+          </a:xfrm>
+          <a:prstGeom prst="rect">
+            <a:avLst/>
+          </a:prstGeom>
+          <a:noFill/>
+        </p:spPr>
+        <p:txBody>
+          <a:bodyPr wrap="none" rtlCol="1">
+            <a:spAutoFit/>
+          </a:bodyPr>
+          <a:lstStyle/>
+          <a:p>
+            <a:r>
+              <a:rPr lang="en-US" sz="4800" dirty="0" smtClean="0"/>
+              <a:t>Fitness</a:t>
+            </a:r>
+            <a:endParaRPr lang="he-IL" sz="4800" dirty="0"/>
+          </a:p>
+        </p:txBody>
+      </p:sp>
+      <p:sp>
+        <p:nvSpPr>
+          <p:cNvPr id="108" name="TextBox 107"/>
+          <p:cNvSpPr txBox="1"/>
+          <p:nvPr/>
+        </p:nvSpPr>
+        <p:spPr>
+          <a:xfrm>
+            <a:off x="4482803" y="39550278"/>
+            <a:ext cx="3205942" cy="830997"/>
+          </a:xfrm>
+          <a:prstGeom prst="rect">
+            <a:avLst/>
+          </a:prstGeom>
+          <a:noFill/>
+        </p:spPr>
+        <p:txBody>
+          <a:bodyPr wrap="none" rtlCol="1">
+            <a:spAutoFit/>
+          </a:bodyPr>
+          <a:lstStyle/>
+          <a:p>
+            <a:r>
+              <a:rPr lang="en-US" sz="4800" dirty="0" smtClean="0"/>
+              <a:t># Mutations</a:t>
+            </a:r>
+            <a:endParaRPr lang="he-IL" sz="4800" dirty="0"/>
+          </a:p>
+        </p:txBody>
+      </p:sp>
+      <p:grpSp>
+        <p:nvGrpSpPr>
+          <p:cNvPr id="68" name="Group 67"/>
+          <p:cNvGrpSpPr/>
+          <p:nvPr/>
+        </p:nvGrpSpPr>
+        <p:grpSpPr>
+          <a:xfrm>
+            <a:off x="11107539" y="33468499"/>
+            <a:ext cx="7760818" cy="6549811"/>
+            <a:chOff x="11179547" y="33468499"/>
+            <a:chExt cx="7760818" cy="6549811"/>
+          </a:xfrm>
+        </p:grpSpPr>
+        <p:pic>
+          <p:nvPicPr>
+            <p:cNvPr id="33" name="Picture 5"/>
+            <p:cNvPicPr>
+              <a:picLocks noChangeAspect="1" noChangeArrowheads="1"/>
+            </p:cNvPicPr>
+            <p:nvPr/>
+          </p:nvPicPr>
+          <p:blipFill>
+            <a:blip r:embed="rId19">
+              <a:extLst>
+                <a:ext uri="{28A0092B-C50C-407E-A947-70E740481C1C}">
+                  <a14:useLocalDpi xmlns:a14="http://schemas.microsoft.com/office/drawing/2010/main" val="0"/>
+                </a:ext>
+              </a:extLst>
+            </a:blip>
+            <a:srcRect/>
+            <a:stretch>
+              <a:fillRect/>
+            </a:stretch>
+          </p:blipFill>
+          <p:spPr bwMode="auto">
+            <a:xfrm>
+              <a:off x="11179547" y="33646310"/>
+              <a:ext cx="7760818" cy="6372000"/>
+            </a:xfrm>
+            <a:prstGeom prst="rect">
+              <a:avLst/>
+            </a:prstGeom>
+            <a:noFill/>
+            <a:ln>
+              <a:noFill/>
+            </a:ln>
+            <a:effectLst/>
+            <a:extLst>
+              <a:ext uri="{909E8E84-426E-40DD-AFC4-6F175D3DCCD1}">
+                <a14:hiddenFill xmlns:a14="http://schemas.microsoft.com/office/drawing/2010/main">
+                  <a:solidFill>
+                    <a:schemeClr val="accent1"/>
+                  </a:solidFill>
+                </a14:hiddenFill>
+              </a:ext>
+              <a:ext uri="{91240B29-F687-4F45-9708-019B960494DF}">
+                <a14:hiddenLine xmlns:a14="http://schemas.microsoft.com/office/drawing/2010/main" w="9525">
+                  <a:solidFill>
+                    <a:schemeClr val="tx1"/>
+                  </a:solidFill>
+                  <a:miter lim="800000"/>
+                  <a:headEnd/>
+                  <a:tailEnd/>
+                </a14:hiddenLine>
+              </a:ext>
+              <a:ext uri="{AF507438-7753-43E0-B8FC-AC1667EBCBE1}">
+                <a14:hiddenEffects xmlns:a14="http://schemas.microsoft.com/office/drawing/2010/main">
+                  <a:effectLst>
+                    <a:outerShdw dist="35921" dir="2700000" algn="ctr" rotWithShape="0">
+                      <a:schemeClr val="bg2"/>
+                    </a:outerShdw>
+                  </a:effectLst>
+                </a14:hiddenEffects>
+              </a:ext>
+            </a:extLst>
+          </p:spPr>
+        </p:pic>
+        <p:sp>
+          <p:nvSpPr>
+            <p:cNvPr id="67" name="Rectangle 66"/>
+            <p:cNvSpPr/>
+            <p:nvPr/>
+          </p:nvSpPr>
+          <p:spPr>
+            <a:xfrm>
+              <a:off x="11179547" y="33468499"/>
+              <a:ext cx="371248" cy="687960"/>
+            </a:xfrm>
+            <a:prstGeom prst="rect">
+              <a:avLst/>
+            </a:prstGeom>
+            <a:solidFill>
+              <a:schemeClr val="bg1"/>
+            </a:solidFill>
+            <a:ln>
+              <a:noFill/>
+            </a:ln>
+          </p:spPr>
+          <p:style>
+            <a:lnRef idx="2">
+              <a:schemeClr val="accent1">
+                <a:shade val="50000"/>
+              </a:schemeClr>
+            </a:lnRef>
+            <a:fillRef idx="1">
+              <a:schemeClr val="accent1"/>
+            </a:fillRef>
+            <a:effectRef idx="0">
+              <a:schemeClr val="accent1"/>
+            </a:effectRef>
+            <a:fontRef idx="minor">
+              <a:schemeClr val="lt1"/>
+            </a:fontRef>
+          </p:style>
+          <p:txBody>
+            <a:bodyPr rtlCol="1" anchor="ctr"/>
+            <a:lstStyle/>
+            <a:p>
+              <a:pPr algn="ctr"/>
+              <a:endParaRPr lang="he-IL"/>
+            </a:p>
+          </p:txBody>
+        </p:sp>
+      </p:grpSp>
+      <p:sp>
+        <p:nvSpPr>
+          <p:cNvPr id="72" name="TextBox 71"/>
+          <p:cNvSpPr txBox="1"/>
+          <p:nvPr/>
+        </p:nvSpPr>
+        <p:spPr>
+          <a:xfrm>
+            <a:off x="11035531" y="33462705"/>
+            <a:ext cx="1030528" cy="830989"/>
+          </a:xfrm>
+          <a:prstGeom prst="rect">
+            <a:avLst/>
+          </a:prstGeom>
+          <a:noFill/>
+        </p:spPr>
+        <p:txBody>
+          <a:bodyPr wrap="square" lIns="91431" tIns="45716" rIns="91431" bIns="45716" rtlCol="1">
+            <a:spAutoFit/>
+          </a:bodyPr>
+          <a:lstStyle/>
+          <a:p>
+            <a:pPr rtl="0"/>
+            <a:r>
+              <a:rPr lang="en-US" sz="4800" dirty="0"/>
+              <a:t>[4]</a:t>
+            </a:r>
+            <a:endParaRPr lang="he-IL" sz="4800" dirty="0"/>
+          </a:p>
+        </p:txBody>
+      </p:sp>
+      <p:sp>
+        <p:nvSpPr>
+          <p:cNvPr id="119" name="TextBox 118"/>
+          <p:cNvSpPr txBox="1"/>
+          <p:nvPr/>
+        </p:nvSpPr>
+        <p:spPr>
+          <a:xfrm>
+            <a:off x="13771835" y="39583377"/>
+            <a:ext cx="3205942" cy="830997"/>
+          </a:xfrm>
+          <a:prstGeom prst="rect">
+            <a:avLst/>
+          </a:prstGeom>
+          <a:solidFill>
+            <a:schemeClr val="bg1"/>
+          </a:solidFill>
+        </p:spPr>
+        <p:txBody>
+          <a:bodyPr wrap="none" rtlCol="1">
+            <a:spAutoFit/>
+          </a:bodyPr>
+          <a:lstStyle/>
+          <a:p>
+            <a:r>
+              <a:rPr lang="en-US" sz="4800" dirty="0" smtClean="0"/>
+              <a:t># Mutations</a:t>
+            </a:r>
+            <a:endParaRPr lang="he-IL" sz="4800" dirty="0"/>
+          </a:p>
+        </p:txBody>
+      </p:sp>
+      <p:sp>
+        <p:nvSpPr>
+          <p:cNvPr id="111" name="TextBox 110"/>
+          <p:cNvSpPr txBox="1"/>
+          <p:nvPr/>
+        </p:nvSpPr>
+        <p:spPr>
+          <a:xfrm rot="16200000">
+            <a:off x="10488266" y="35993087"/>
+            <a:ext cx="1925527" cy="830997"/>
+          </a:xfrm>
+          <a:prstGeom prst="rect">
+            <a:avLst/>
+          </a:prstGeom>
+          <a:noFill/>
+        </p:spPr>
+        <p:txBody>
+          <a:bodyPr wrap="none" rtlCol="1">
+            <a:spAutoFit/>
+          </a:bodyPr>
+          <a:lstStyle/>
+          <a:p>
+            <a:r>
+              <a:rPr lang="en-US" sz="4800" dirty="0" smtClean="0"/>
+              <a:t>Fitness</a:t>
+            </a:r>
+            <a:endParaRPr lang="he-IL" sz="4800" dirty="0"/>
           </a:p>
         </p:txBody>
       </p:sp>

</xml_diff>